<commit_message>
separate constraint and axioms
</commit_message>
<xml_diff>
--- a/presentations/Tutorial Thomas Bosch (DC 2014).pptx
+++ b/presentations/Tutorial Thomas Bosch (DC 2014).pptx
@@ -16,17 +16,17 @@
     <p:sldId id="303" r:id="rId11"/>
     <p:sldId id="301" r:id="rId12"/>
     <p:sldId id="363" r:id="rId13"/>
-    <p:sldId id="305" r:id="rId14"/>
+    <p:sldId id="364" r:id="rId14"/>
     <p:sldId id="306" r:id="rId15"/>
     <p:sldId id="307" r:id="rId16"/>
     <p:sldId id="308" r:id="rId17"/>
     <p:sldId id="309" r:id="rId18"/>
-    <p:sldId id="321" r:id="rId19"/>
-    <p:sldId id="314" r:id="rId20"/>
+    <p:sldId id="365" r:id="rId19"/>
+    <p:sldId id="366" r:id="rId20"/>
     <p:sldId id="316" r:id="rId21"/>
     <p:sldId id="315" r:id="rId22"/>
     <p:sldId id="320" r:id="rId23"/>
-    <p:sldId id="319" r:id="rId24"/>
+    <p:sldId id="367" r:id="rId24"/>
     <p:sldId id="356" r:id="rId25"/>
     <p:sldId id="355" r:id="rId26"/>
     <p:sldId id="358" r:id="rId27"/>
@@ -679,7 +679,7 @@
           <a:p>
             <a:fld id="{DE2197E9-CAEE-4794-8561-B4165D319F7A}" type="slidenum">
               <a:rPr lang="en-US" smtClean="0"/>
-              <a:t>11</a:t>
+              <a:t>12</a:t>
             </a:fld>
             <a:endParaRPr lang="en-US"/>
           </a:p>
@@ -688,7 +688,7 @@
     </p:spTree>
     <p:extLst>
       <p:ext uri="{BB962C8B-B14F-4D97-AF65-F5344CB8AC3E}">
-        <p14:creationId xmlns:p14="http://schemas.microsoft.com/office/powerpoint/2010/main" val="2956820930"/>
+        <p14:creationId xmlns:p14="http://schemas.microsoft.com/office/powerpoint/2010/main" val="1253251136"/>
       </p:ext>
     </p:extLst>
   </p:cSld>
@@ -763,7 +763,7 @@
           <a:p>
             <a:fld id="{DE2197E9-CAEE-4794-8561-B4165D319F7A}" type="slidenum">
               <a:rPr lang="en-US" smtClean="0"/>
-              <a:t>12</a:t>
+              <a:t>13</a:t>
             </a:fld>
             <a:endParaRPr lang="en-US"/>
           </a:p>
@@ -772,7 +772,7 @@
     </p:spTree>
     <p:extLst>
       <p:ext uri="{BB962C8B-B14F-4D97-AF65-F5344CB8AC3E}">
-        <p14:creationId xmlns:p14="http://schemas.microsoft.com/office/powerpoint/2010/main" val="1253251136"/>
+        <p14:creationId xmlns:p14="http://schemas.microsoft.com/office/powerpoint/2010/main" val="3421016002"/>
       </p:ext>
     </p:extLst>
   </p:cSld>
@@ -847,7 +847,7 @@
           <a:p>
             <a:fld id="{DE2197E9-CAEE-4794-8561-B4165D319F7A}" type="slidenum">
               <a:rPr lang="en-US" smtClean="0"/>
-              <a:t>13</a:t>
+              <a:t>15</a:t>
             </a:fld>
             <a:endParaRPr lang="en-US"/>
           </a:p>
@@ -856,7 +856,7 @@
     </p:spTree>
     <p:extLst>
       <p:ext uri="{BB962C8B-B14F-4D97-AF65-F5344CB8AC3E}">
-        <p14:creationId xmlns:p14="http://schemas.microsoft.com/office/powerpoint/2010/main" val="3640392698"/>
+        <p14:creationId xmlns:p14="http://schemas.microsoft.com/office/powerpoint/2010/main" val="887510661"/>
       </p:ext>
     </p:extLst>
   </p:cSld>
@@ -931,7 +931,7 @@
           <a:p>
             <a:fld id="{DE2197E9-CAEE-4794-8561-B4165D319F7A}" type="slidenum">
               <a:rPr lang="en-US" smtClean="0"/>
-              <a:t>14</a:t>
+              <a:t>16</a:t>
             </a:fld>
             <a:endParaRPr lang="en-US"/>
           </a:p>
@@ -940,7 +940,7 @@
     </p:spTree>
     <p:extLst>
       <p:ext uri="{BB962C8B-B14F-4D97-AF65-F5344CB8AC3E}">
-        <p14:creationId xmlns:p14="http://schemas.microsoft.com/office/powerpoint/2010/main" val="1398076633"/>
+        <p14:creationId xmlns:p14="http://schemas.microsoft.com/office/powerpoint/2010/main" val="3338899861"/>
       </p:ext>
     </p:extLst>
   </p:cSld>
@@ -1015,7 +1015,7 @@
           <a:p>
             <a:fld id="{DE2197E9-CAEE-4794-8561-B4165D319F7A}" type="slidenum">
               <a:rPr lang="en-US" smtClean="0"/>
-              <a:t>15</a:t>
+              <a:t>17</a:t>
             </a:fld>
             <a:endParaRPr lang="en-US"/>
           </a:p>
@@ -1024,7 +1024,7 @@
     </p:spTree>
     <p:extLst>
       <p:ext uri="{BB962C8B-B14F-4D97-AF65-F5344CB8AC3E}">
-        <p14:creationId xmlns:p14="http://schemas.microsoft.com/office/powerpoint/2010/main" val="887510661"/>
+        <p14:creationId xmlns:p14="http://schemas.microsoft.com/office/powerpoint/2010/main" val="2020389239"/>
       </p:ext>
     </p:extLst>
   </p:cSld>
@@ -1099,7 +1099,7 @@
           <a:p>
             <a:fld id="{DE2197E9-CAEE-4794-8561-B4165D319F7A}" type="slidenum">
               <a:rPr lang="en-US" smtClean="0"/>
-              <a:t>16</a:t>
+              <a:t>18</a:t>
             </a:fld>
             <a:endParaRPr lang="en-US"/>
           </a:p>
@@ -1108,7 +1108,7 @@
     </p:spTree>
     <p:extLst>
       <p:ext uri="{BB962C8B-B14F-4D97-AF65-F5344CB8AC3E}">
-        <p14:creationId xmlns:p14="http://schemas.microsoft.com/office/powerpoint/2010/main" val="3338899861"/>
+        <p14:creationId xmlns:p14="http://schemas.microsoft.com/office/powerpoint/2010/main" val="4008867259"/>
       </p:ext>
     </p:extLst>
   </p:cSld>
@@ -1183,7 +1183,7 @@
           <a:p>
             <a:fld id="{DE2197E9-CAEE-4794-8561-B4165D319F7A}" type="slidenum">
               <a:rPr lang="en-US" smtClean="0"/>
-              <a:t>17</a:t>
+              <a:t>20</a:t>
             </a:fld>
             <a:endParaRPr lang="en-US"/>
           </a:p>
@@ -1192,7 +1192,7 @@
     </p:spTree>
     <p:extLst>
       <p:ext uri="{BB962C8B-B14F-4D97-AF65-F5344CB8AC3E}">
-        <p14:creationId xmlns:p14="http://schemas.microsoft.com/office/powerpoint/2010/main" val="2020389239"/>
+        <p14:creationId xmlns:p14="http://schemas.microsoft.com/office/powerpoint/2010/main" val="1225216630"/>
       </p:ext>
     </p:extLst>
   </p:cSld>
@@ -1267,7 +1267,7 @@
           <a:p>
             <a:fld id="{DE2197E9-CAEE-4794-8561-B4165D319F7A}" type="slidenum">
               <a:rPr lang="en-US" smtClean="0"/>
-              <a:t>18</a:t>
+              <a:t>21</a:t>
             </a:fld>
             <a:endParaRPr lang="en-US"/>
           </a:p>
@@ -1276,7 +1276,7 @@
     </p:spTree>
     <p:extLst>
       <p:ext uri="{BB962C8B-B14F-4D97-AF65-F5344CB8AC3E}">
-        <p14:creationId xmlns:p14="http://schemas.microsoft.com/office/powerpoint/2010/main" val="2545417653"/>
+        <p14:creationId xmlns:p14="http://schemas.microsoft.com/office/powerpoint/2010/main" val="4257926907"/>
       </p:ext>
     </p:extLst>
   </p:cSld>
@@ -1351,7 +1351,7 @@
           <a:p>
             <a:fld id="{DE2197E9-CAEE-4794-8561-B4165D319F7A}" type="slidenum">
               <a:rPr lang="en-US" smtClean="0"/>
-              <a:t>20</a:t>
+              <a:t>22</a:t>
             </a:fld>
             <a:endParaRPr lang="en-US"/>
           </a:p>
@@ -1360,7 +1360,7 @@
     </p:spTree>
     <p:extLst>
       <p:ext uri="{BB962C8B-B14F-4D97-AF65-F5344CB8AC3E}">
-        <p14:creationId xmlns:p14="http://schemas.microsoft.com/office/powerpoint/2010/main" val="1225216630"/>
+        <p14:creationId xmlns:p14="http://schemas.microsoft.com/office/powerpoint/2010/main" val="4118294627"/>
       </p:ext>
     </p:extLst>
   </p:cSld>
@@ -1435,7 +1435,7 @@
           <a:p>
             <a:fld id="{DE2197E9-CAEE-4794-8561-B4165D319F7A}" type="slidenum">
               <a:rPr lang="en-US" smtClean="0"/>
-              <a:t>21</a:t>
+              <a:t>23</a:t>
             </a:fld>
             <a:endParaRPr lang="en-US"/>
           </a:p>
@@ -1444,7 +1444,7 @@
     </p:spTree>
     <p:extLst>
       <p:ext uri="{BB962C8B-B14F-4D97-AF65-F5344CB8AC3E}">
-        <p14:creationId xmlns:p14="http://schemas.microsoft.com/office/powerpoint/2010/main" val="4257926907"/>
+        <p14:creationId xmlns:p14="http://schemas.microsoft.com/office/powerpoint/2010/main" val="932157393"/>
       </p:ext>
     </p:extLst>
   </p:cSld>
@@ -1603,7 +1603,7 @@
           <a:p>
             <a:fld id="{DE2197E9-CAEE-4794-8561-B4165D319F7A}" type="slidenum">
               <a:rPr lang="en-US" smtClean="0"/>
-              <a:t>22</a:t>
+              <a:t>24</a:t>
             </a:fld>
             <a:endParaRPr lang="en-US"/>
           </a:p>
@@ -1612,7 +1612,7 @@
     </p:spTree>
     <p:extLst>
       <p:ext uri="{BB962C8B-B14F-4D97-AF65-F5344CB8AC3E}">
-        <p14:creationId xmlns:p14="http://schemas.microsoft.com/office/powerpoint/2010/main" val="4118294627"/>
+        <p14:creationId xmlns:p14="http://schemas.microsoft.com/office/powerpoint/2010/main" val="2498722055"/>
       </p:ext>
     </p:extLst>
   </p:cSld>
@@ -1687,7 +1687,7 @@
           <a:p>
             <a:fld id="{DE2197E9-CAEE-4794-8561-B4165D319F7A}" type="slidenum">
               <a:rPr lang="en-US" smtClean="0"/>
-              <a:t>23</a:t>
+              <a:t>26</a:t>
             </a:fld>
             <a:endParaRPr lang="en-US"/>
           </a:p>
@@ -1696,7 +1696,7 @@
     </p:spTree>
     <p:extLst>
       <p:ext uri="{BB962C8B-B14F-4D97-AF65-F5344CB8AC3E}">
-        <p14:creationId xmlns:p14="http://schemas.microsoft.com/office/powerpoint/2010/main" val="932157393"/>
+        <p14:creationId xmlns:p14="http://schemas.microsoft.com/office/powerpoint/2010/main" val="1710935335"/>
       </p:ext>
     </p:extLst>
   </p:cSld>
@@ -1771,7 +1771,7 @@
           <a:p>
             <a:fld id="{DE2197E9-CAEE-4794-8561-B4165D319F7A}" type="slidenum">
               <a:rPr lang="en-US" smtClean="0"/>
-              <a:t>24</a:t>
+              <a:t>27</a:t>
             </a:fld>
             <a:endParaRPr lang="en-US"/>
           </a:p>
@@ -1780,7 +1780,7 @@
     </p:spTree>
     <p:extLst>
       <p:ext uri="{BB962C8B-B14F-4D97-AF65-F5344CB8AC3E}">
-        <p14:creationId xmlns:p14="http://schemas.microsoft.com/office/powerpoint/2010/main" val="2498722055"/>
+        <p14:creationId xmlns:p14="http://schemas.microsoft.com/office/powerpoint/2010/main" val="158574559"/>
       </p:ext>
     </p:extLst>
   </p:cSld>
@@ -1855,7 +1855,7 @@
           <a:p>
             <a:fld id="{DE2197E9-CAEE-4794-8561-B4165D319F7A}" type="slidenum">
               <a:rPr lang="en-US" smtClean="0"/>
-              <a:t>26</a:t>
+              <a:t>28</a:t>
             </a:fld>
             <a:endParaRPr lang="en-US"/>
           </a:p>
@@ -1864,7 +1864,7 @@
     </p:spTree>
     <p:extLst>
       <p:ext uri="{BB962C8B-B14F-4D97-AF65-F5344CB8AC3E}">
-        <p14:creationId xmlns:p14="http://schemas.microsoft.com/office/powerpoint/2010/main" val="1710935335"/>
+        <p14:creationId xmlns:p14="http://schemas.microsoft.com/office/powerpoint/2010/main" val="756728807"/>
       </p:ext>
     </p:extLst>
   </p:cSld>
@@ -1939,7 +1939,7 @@
           <a:p>
             <a:fld id="{DE2197E9-CAEE-4794-8561-B4165D319F7A}" type="slidenum">
               <a:rPr lang="en-US" smtClean="0"/>
-              <a:t>27</a:t>
+              <a:t>29</a:t>
             </a:fld>
             <a:endParaRPr lang="en-US"/>
           </a:p>
@@ -1948,7 +1948,7 @@
     </p:spTree>
     <p:extLst>
       <p:ext uri="{BB962C8B-B14F-4D97-AF65-F5344CB8AC3E}">
-        <p14:creationId xmlns:p14="http://schemas.microsoft.com/office/powerpoint/2010/main" val="158574559"/>
+        <p14:creationId xmlns:p14="http://schemas.microsoft.com/office/powerpoint/2010/main" val="1135856107"/>
       </p:ext>
     </p:extLst>
   </p:cSld>
@@ -2023,7 +2023,7 @@
           <a:p>
             <a:fld id="{DE2197E9-CAEE-4794-8561-B4165D319F7A}" type="slidenum">
               <a:rPr lang="en-US" smtClean="0"/>
-              <a:t>28</a:t>
+              <a:t>30</a:t>
             </a:fld>
             <a:endParaRPr lang="en-US"/>
           </a:p>
@@ -2032,7 +2032,7 @@
     </p:spTree>
     <p:extLst>
       <p:ext uri="{BB962C8B-B14F-4D97-AF65-F5344CB8AC3E}">
-        <p14:creationId xmlns:p14="http://schemas.microsoft.com/office/powerpoint/2010/main" val="756728807"/>
+        <p14:creationId xmlns:p14="http://schemas.microsoft.com/office/powerpoint/2010/main" val="710640063"/>
       </p:ext>
     </p:extLst>
   </p:cSld>
@@ -2107,7 +2107,7 @@
           <a:p>
             <a:fld id="{DE2197E9-CAEE-4794-8561-B4165D319F7A}" type="slidenum">
               <a:rPr lang="en-US" smtClean="0"/>
-              <a:t>29</a:t>
+              <a:t>32</a:t>
             </a:fld>
             <a:endParaRPr lang="en-US"/>
           </a:p>
@@ -2116,7 +2116,7 @@
     </p:spTree>
     <p:extLst>
       <p:ext uri="{BB962C8B-B14F-4D97-AF65-F5344CB8AC3E}">
-        <p14:creationId xmlns:p14="http://schemas.microsoft.com/office/powerpoint/2010/main" val="1135856107"/>
+        <p14:creationId xmlns:p14="http://schemas.microsoft.com/office/powerpoint/2010/main" val="4218940158"/>
       </p:ext>
     </p:extLst>
   </p:cSld>
@@ -2191,7 +2191,7 @@
           <a:p>
             <a:fld id="{DE2197E9-CAEE-4794-8561-B4165D319F7A}" type="slidenum">
               <a:rPr lang="en-US" smtClean="0"/>
-              <a:t>30</a:t>
+              <a:t>33</a:t>
             </a:fld>
             <a:endParaRPr lang="en-US"/>
           </a:p>
@@ -2200,7 +2200,7 @@
     </p:spTree>
     <p:extLst>
       <p:ext uri="{BB962C8B-B14F-4D97-AF65-F5344CB8AC3E}">
-        <p14:creationId xmlns:p14="http://schemas.microsoft.com/office/powerpoint/2010/main" val="710640063"/>
+        <p14:creationId xmlns:p14="http://schemas.microsoft.com/office/powerpoint/2010/main" val="4140331789"/>
       </p:ext>
     </p:extLst>
   </p:cSld>
@@ -2275,7 +2275,7 @@
           <a:p>
             <a:fld id="{DE2197E9-CAEE-4794-8561-B4165D319F7A}" type="slidenum">
               <a:rPr lang="en-US" smtClean="0"/>
-              <a:t>32</a:t>
+              <a:t>34</a:t>
             </a:fld>
             <a:endParaRPr lang="en-US"/>
           </a:p>
@@ -2284,7 +2284,7 @@
     </p:spTree>
     <p:extLst>
       <p:ext uri="{BB962C8B-B14F-4D97-AF65-F5344CB8AC3E}">
-        <p14:creationId xmlns:p14="http://schemas.microsoft.com/office/powerpoint/2010/main" val="4218940158"/>
+        <p14:creationId xmlns:p14="http://schemas.microsoft.com/office/powerpoint/2010/main" val="2958007601"/>
       </p:ext>
     </p:extLst>
   </p:cSld>
@@ -2359,7 +2359,7 @@
           <a:p>
             <a:fld id="{DE2197E9-CAEE-4794-8561-B4165D319F7A}" type="slidenum">
               <a:rPr lang="en-US" smtClean="0"/>
-              <a:t>33</a:t>
+              <a:t>35</a:t>
             </a:fld>
             <a:endParaRPr lang="en-US"/>
           </a:p>
@@ -2368,7 +2368,7 @@
     </p:spTree>
     <p:extLst>
       <p:ext uri="{BB962C8B-B14F-4D97-AF65-F5344CB8AC3E}">
-        <p14:creationId xmlns:p14="http://schemas.microsoft.com/office/powerpoint/2010/main" val="4140331789"/>
+        <p14:creationId xmlns:p14="http://schemas.microsoft.com/office/powerpoint/2010/main" val="1951718115"/>
       </p:ext>
     </p:extLst>
   </p:cSld>
@@ -2527,7 +2527,7 @@
           <a:p>
             <a:fld id="{DE2197E9-CAEE-4794-8561-B4165D319F7A}" type="slidenum">
               <a:rPr lang="en-US" smtClean="0"/>
-              <a:t>34</a:t>
+              <a:t>36</a:t>
             </a:fld>
             <a:endParaRPr lang="en-US"/>
           </a:p>
@@ -2536,7 +2536,7 @@
     </p:spTree>
     <p:extLst>
       <p:ext uri="{BB962C8B-B14F-4D97-AF65-F5344CB8AC3E}">
-        <p14:creationId xmlns:p14="http://schemas.microsoft.com/office/powerpoint/2010/main" val="2958007601"/>
+        <p14:creationId xmlns:p14="http://schemas.microsoft.com/office/powerpoint/2010/main" val="1606750595"/>
       </p:ext>
     </p:extLst>
   </p:cSld>
@@ -2611,7 +2611,7 @@
           <a:p>
             <a:fld id="{DE2197E9-CAEE-4794-8561-B4165D319F7A}" type="slidenum">
               <a:rPr lang="en-US" smtClean="0"/>
-              <a:t>35</a:t>
+              <a:t>37</a:t>
             </a:fld>
             <a:endParaRPr lang="en-US"/>
           </a:p>
@@ -2620,7 +2620,7 @@
     </p:spTree>
     <p:extLst>
       <p:ext uri="{BB962C8B-B14F-4D97-AF65-F5344CB8AC3E}">
-        <p14:creationId xmlns:p14="http://schemas.microsoft.com/office/powerpoint/2010/main" val="1951718115"/>
+        <p14:creationId xmlns:p14="http://schemas.microsoft.com/office/powerpoint/2010/main" val="124512951"/>
       </p:ext>
     </p:extLst>
   </p:cSld>
@@ -2695,7 +2695,7 @@
           <a:p>
             <a:fld id="{DE2197E9-CAEE-4794-8561-B4165D319F7A}" type="slidenum">
               <a:rPr lang="en-US" smtClean="0"/>
-              <a:t>36</a:t>
+              <a:t>39</a:t>
             </a:fld>
             <a:endParaRPr lang="en-US"/>
           </a:p>
@@ -2704,7 +2704,7 @@
     </p:spTree>
     <p:extLst>
       <p:ext uri="{BB962C8B-B14F-4D97-AF65-F5344CB8AC3E}">
-        <p14:creationId xmlns:p14="http://schemas.microsoft.com/office/powerpoint/2010/main" val="1606750595"/>
+        <p14:creationId xmlns:p14="http://schemas.microsoft.com/office/powerpoint/2010/main" val="913198369"/>
       </p:ext>
     </p:extLst>
   </p:cSld>
@@ -2779,7 +2779,7 @@
           <a:p>
             <a:fld id="{DE2197E9-CAEE-4794-8561-B4165D319F7A}" type="slidenum">
               <a:rPr lang="en-US" smtClean="0"/>
-              <a:t>37</a:t>
+              <a:t>41</a:t>
             </a:fld>
             <a:endParaRPr lang="en-US"/>
           </a:p>
@@ -2788,7 +2788,7 @@
     </p:spTree>
     <p:extLst>
       <p:ext uri="{BB962C8B-B14F-4D97-AF65-F5344CB8AC3E}">
-        <p14:creationId xmlns:p14="http://schemas.microsoft.com/office/powerpoint/2010/main" val="124512951"/>
+        <p14:creationId xmlns:p14="http://schemas.microsoft.com/office/powerpoint/2010/main" val="4032796987"/>
       </p:ext>
     </p:extLst>
   </p:cSld>
@@ -2863,7 +2863,7 @@
           <a:p>
             <a:fld id="{DE2197E9-CAEE-4794-8561-B4165D319F7A}" type="slidenum">
               <a:rPr lang="en-US" smtClean="0"/>
-              <a:t>39</a:t>
+              <a:t>43</a:t>
             </a:fld>
             <a:endParaRPr lang="en-US"/>
           </a:p>
@@ -2872,7 +2872,7 @@
     </p:spTree>
     <p:extLst>
       <p:ext uri="{BB962C8B-B14F-4D97-AF65-F5344CB8AC3E}">
-        <p14:creationId xmlns:p14="http://schemas.microsoft.com/office/powerpoint/2010/main" val="913198369"/>
+        <p14:creationId xmlns:p14="http://schemas.microsoft.com/office/powerpoint/2010/main" val="451687962"/>
       </p:ext>
     </p:extLst>
   </p:cSld>
@@ -2947,7 +2947,7 @@
           <a:p>
             <a:fld id="{DE2197E9-CAEE-4794-8561-B4165D319F7A}" type="slidenum">
               <a:rPr lang="en-US" smtClean="0"/>
-              <a:t>41</a:t>
+              <a:t>45</a:t>
             </a:fld>
             <a:endParaRPr lang="en-US"/>
           </a:p>
@@ -2956,7 +2956,7 @@
     </p:spTree>
     <p:extLst>
       <p:ext uri="{BB962C8B-B14F-4D97-AF65-F5344CB8AC3E}">
-        <p14:creationId xmlns:p14="http://schemas.microsoft.com/office/powerpoint/2010/main" val="4032796987"/>
+        <p14:creationId xmlns:p14="http://schemas.microsoft.com/office/powerpoint/2010/main" val="69783583"/>
       </p:ext>
     </p:extLst>
   </p:cSld>
@@ -3031,7 +3031,7 @@
           <a:p>
             <a:fld id="{DE2197E9-CAEE-4794-8561-B4165D319F7A}" type="slidenum">
               <a:rPr lang="en-US" smtClean="0"/>
-              <a:t>43</a:t>
+              <a:t>47</a:t>
             </a:fld>
             <a:endParaRPr lang="en-US"/>
           </a:p>
@@ -3040,7 +3040,7 @@
     </p:spTree>
     <p:extLst>
       <p:ext uri="{BB962C8B-B14F-4D97-AF65-F5344CB8AC3E}">
-        <p14:creationId xmlns:p14="http://schemas.microsoft.com/office/powerpoint/2010/main" val="451687962"/>
+        <p14:creationId xmlns:p14="http://schemas.microsoft.com/office/powerpoint/2010/main" val="2406226910"/>
       </p:ext>
     </p:extLst>
   </p:cSld>
@@ -3115,7 +3115,7 @@
           <a:p>
             <a:fld id="{DE2197E9-CAEE-4794-8561-B4165D319F7A}" type="slidenum">
               <a:rPr lang="en-US" smtClean="0"/>
-              <a:t>45</a:t>
+              <a:t>50</a:t>
             </a:fld>
             <a:endParaRPr lang="en-US"/>
           </a:p>
@@ -3124,7 +3124,7 @@
     </p:spTree>
     <p:extLst>
       <p:ext uri="{BB962C8B-B14F-4D97-AF65-F5344CB8AC3E}">
-        <p14:creationId xmlns:p14="http://schemas.microsoft.com/office/powerpoint/2010/main" val="69783583"/>
+        <p14:creationId xmlns:p14="http://schemas.microsoft.com/office/powerpoint/2010/main" val="3345068922"/>
       </p:ext>
     </p:extLst>
   </p:cSld>
@@ -3199,7 +3199,7 @@
           <a:p>
             <a:fld id="{DE2197E9-CAEE-4794-8561-B4165D319F7A}" type="slidenum">
               <a:rPr lang="en-US" smtClean="0"/>
-              <a:t>47</a:t>
+              <a:t>51</a:t>
             </a:fld>
             <a:endParaRPr lang="en-US"/>
           </a:p>
@@ -3208,7 +3208,7 @@
     </p:spTree>
     <p:extLst>
       <p:ext uri="{BB962C8B-B14F-4D97-AF65-F5344CB8AC3E}">
-        <p14:creationId xmlns:p14="http://schemas.microsoft.com/office/powerpoint/2010/main" val="2406226910"/>
+        <p14:creationId xmlns:p14="http://schemas.microsoft.com/office/powerpoint/2010/main" val="3922645380"/>
       </p:ext>
     </p:extLst>
   </p:cSld>
@@ -3283,7 +3283,7 @@
           <a:p>
             <a:fld id="{DE2197E9-CAEE-4794-8561-B4165D319F7A}" type="slidenum">
               <a:rPr lang="en-US" smtClean="0"/>
-              <a:t>50</a:t>
+              <a:t>52</a:t>
             </a:fld>
             <a:endParaRPr lang="en-US"/>
           </a:p>
@@ -3292,7 +3292,7 @@
     </p:spTree>
     <p:extLst>
       <p:ext uri="{BB962C8B-B14F-4D97-AF65-F5344CB8AC3E}">
-        <p14:creationId xmlns:p14="http://schemas.microsoft.com/office/powerpoint/2010/main" val="3345068922"/>
+        <p14:creationId xmlns:p14="http://schemas.microsoft.com/office/powerpoint/2010/main" val="3064995435"/>
       </p:ext>
     </p:extLst>
   </p:cSld>
@@ -3377,174 +3377,6 @@
     <p:extLst>
       <p:ext uri="{BB962C8B-B14F-4D97-AF65-F5344CB8AC3E}">
         <p14:creationId xmlns:p14="http://schemas.microsoft.com/office/powerpoint/2010/main" val="2218803072"/>
-      </p:ext>
-    </p:extLst>
-  </p:cSld>
-  <p:clrMapOvr>
-    <a:masterClrMapping/>
-  </p:clrMapOvr>
-</p:notes>
-</file>
-
-<file path=ppt/notesSlides/notesSlide40.xml><?xml version="1.0" encoding="utf-8"?>
-<p:notes xmlns:a="http://schemas.openxmlformats.org/drawingml/2006/main" xmlns:r="http://schemas.openxmlformats.org/officeDocument/2006/relationships" xmlns:p="http://schemas.openxmlformats.org/presentationml/2006/main">
-  <p:cSld>
-    <p:spTree>
-      <p:nvGrpSpPr>
-        <p:cNvPr id="1" name=""/>
-        <p:cNvGrpSpPr/>
-        <p:nvPr/>
-      </p:nvGrpSpPr>
-      <p:grpSpPr>
-        <a:xfrm>
-          <a:off x="0" y="0"/>
-          <a:ext cx="0" cy="0"/>
-          <a:chOff x="0" y="0"/>
-          <a:chExt cx="0" cy="0"/>
-        </a:xfrm>
-      </p:grpSpPr>
-      <p:sp>
-        <p:nvSpPr>
-          <p:cNvPr id="2" name="Folienbildplatzhalter 1"/>
-          <p:cNvSpPr>
-            <a:spLocks noGrp="1" noRot="1" noChangeAspect="1"/>
-          </p:cNvSpPr>
-          <p:nvPr>
-            <p:ph type="sldImg"/>
-          </p:nvPr>
-        </p:nvSpPr>
-        <p:spPr/>
-      </p:sp>
-      <p:sp>
-        <p:nvSpPr>
-          <p:cNvPr id="3" name="Notizenplatzhalter 2"/>
-          <p:cNvSpPr>
-            <a:spLocks noGrp="1"/>
-          </p:cNvSpPr>
-          <p:nvPr>
-            <p:ph type="body" idx="1"/>
-          </p:nvPr>
-        </p:nvSpPr>
-        <p:spPr/>
-        <p:txBody>
-          <a:bodyPr/>
-          <a:lstStyle/>
-          <a:p>
-            <a:endParaRPr lang="en-US"/>
-          </a:p>
-        </p:txBody>
-      </p:sp>
-      <p:sp>
-        <p:nvSpPr>
-          <p:cNvPr id="4" name="Foliennummernplatzhalter 3"/>
-          <p:cNvSpPr>
-            <a:spLocks noGrp="1"/>
-          </p:cNvSpPr>
-          <p:nvPr>
-            <p:ph type="sldNum" sz="quarter" idx="10"/>
-          </p:nvPr>
-        </p:nvSpPr>
-        <p:spPr/>
-        <p:txBody>
-          <a:bodyPr/>
-          <a:lstStyle/>
-          <a:p>
-            <a:fld id="{DE2197E9-CAEE-4794-8561-B4165D319F7A}" type="slidenum">
-              <a:rPr lang="en-US" smtClean="0"/>
-              <a:t>51</a:t>
-            </a:fld>
-            <a:endParaRPr lang="en-US"/>
-          </a:p>
-        </p:txBody>
-      </p:sp>
-    </p:spTree>
-    <p:extLst>
-      <p:ext uri="{BB962C8B-B14F-4D97-AF65-F5344CB8AC3E}">
-        <p14:creationId xmlns:p14="http://schemas.microsoft.com/office/powerpoint/2010/main" val="3922645380"/>
-      </p:ext>
-    </p:extLst>
-  </p:cSld>
-  <p:clrMapOvr>
-    <a:masterClrMapping/>
-  </p:clrMapOvr>
-</p:notes>
-</file>
-
-<file path=ppt/notesSlides/notesSlide41.xml><?xml version="1.0" encoding="utf-8"?>
-<p:notes xmlns:a="http://schemas.openxmlformats.org/drawingml/2006/main" xmlns:r="http://schemas.openxmlformats.org/officeDocument/2006/relationships" xmlns:p="http://schemas.openxmlformats.org/presentationml/2006/main">
-  <p:cSld>
-    <p:spTree>
-      <p:nvGrpSpPr>
-        <p:cNvPr id="1" name=""/>
-        <p:cNvGrpSpPr/>
-        <p:nvPr/>
-      </p:nvGrpSpPr>
-      <p:grpSpPr>
-        <a:xfrm>
-          <a:off x="0" y="0"/>
-          <a:ext cx="0" cy="0"/>
-          <a:chOff x="0" y="0"/>
-          <a:chExt cx="0" cy="0"/>
-        </a:xfrm>
-      </p:grpSpPr>
-      <p:sp>
-        <p:nvSpPr>
-          <p:cNvPr id="2" name="Folienbildplatzhalter 1"/>
-          <p:cNvSpPr>
-            <a:spLocks noGrp="1" noRot="1" noChangeAspect="1"/>
-          </p:cNvSpPr>
-          <p:nvPr>
-            <p:ph type="sldImg"/>
-          </p:nvPr>
-        </p:nvSpPr>
-        <p:spPr/>
-      </p:sp>
-      <p:sp>
-        <p:nvSpPr>
-          <p:cNvPr id="3" name="Notizenplatzhalter 2"/>
-          <p:cNvSpPr>
-            <a:spLocks noGrp="1"/>
-          </p:cNvSpPr>
-          <p:nvPr>
-            <p:ph type="body" idx="1"/>
-          </p:nvPr>
-        </p:nvSpPr>
-        <p:spPr/>
-        <p:txBody>
-          <a:bodyPr/>
-          <a:lstStyle/>
-          <a:p>
-            <a:endParaRPr lang="en-US"/>
-          </a:p>
-        </p:txBody>
-      </p:sp>
-      <p:sp>
-        <p:nvSpPr>
-          <p:cNvPr id="4" name="Foliennummernplatzhalter 3"/>
-          <p:cNvSpPr>
-            <a:spLocks noGrp="1"/>
-          </p:cNvSpPr>
-          <p:nvPr>
-            <p:ph type="sldNum" sz="quarter" idx="10"/>
-          </p:nvPr>
-        </p:nvSpPr>
-        <p:spPr/>
-        <p:txBody>
-          <a:bodyPr/>
-          <a:lstStyle/>
-          <a:p>
-            <a:fld id="{DE2197E9-CAEE-4794-8561-B4165D319F7A}" type="slidenum">
-              <a:rPr lang="en-US" smtClean="0"/>
-              <a:t>52</a:t>
-            </a:fld>
-            <a:endParaRPr lang="en-US"/>
-          </a:p>
-        </p:txBody>
-      </p:sp>
-    </p:spTree>
-    <p:extLst>
-      <p:ext uri="{BB962C8B-B14F-4D97-AF65-F5344CB8AC3E}">
-        <p14:creationId xmlns:p14="http://schemas.microsoft.com/office/powerpoint/2010/main" val="3064995435"/>
       </p:ext>
     </p:extLst>
   </p:cSld>
@@ -3787,7 +3619,7 @@
           <a:p>
             <a:fld id="{DE2197E9-CAEE-4794-8561-B4165D319F7A}" type="slidenum">
               <a:rPr lang="en-US" smtClean="0"/>
-              <a:t>8</a:t>
+              <a:t>9</a:t>
             </a:fld>
             <a:endParaRPr lang="en-US"/>
           </a:p>
@@ -3796,7 +3628,7 @@
     </p:spTree>
     <p:extLst>
       <p:ext uri="{BB962C8B-B14F-4D97-AF65-F5344CB8AC3E}">
-        <p14:creationId xmlns:p14="http://schemas.microsoft.com/office/powerpoint/2010/main" val="2807736240"/>
+        <p14:creationId xmlns:p14="http://schemas.microsoft.com/office/powerpoint/2010/main" val="1716646084"/>
       </p:ext>
     </p:extLst>
   </p:cSld>
@@ -3871,7 +3703,7 @@
           <a:p>
             <a:fld id="{DE2197E9-CAEE-4794-8561-B4165D319F7A}" type="slidenum">
               <a:rPr lang="en-US" smtClean="0"/>
-              <a:t>9</a:t>
+              <a:t>10</a:t>
             </a:fld>
             <a:endParaRPr lang="en-US"/>
           </a:p>
@@ -3880,7 +3712,7 @@
     </p:spTree>
     <p:extLst>
       <p:ext uri="{BB962C8B-B14F-4D97-AF65-F5344CB8AC3E}">
-        <p14:creationId xmlns:p14="http://schemas.microsoft.com/office/powerpoint/2010/main" val="1716646084"/>
+        <p14:creationId xmlns:p14="http://schemas.microsoft.com/office/powerpoint/2010/main" val="2459266402"/>
       </p:ext>
     </p:extLst>
   </p:cSld>
@@ -3955,7 +3787,7 @@
           <a:p>
             <a:fld id="{DE2197E9-CAEE-4794-8561-B4165D319F7A}" type="slidenum">
               <a:rPr lang="en-US" smtClean="0"/>
-              <a:t>10</a:t>
+              <a:t>11</a:t>
             </a:fld>
             <a:endParaRPr lang="en-US"/>
           </a:p>
@@ -3964,7 +3796,7 @@
     </p:spTree>
     <p:extLst>
       <p:ext uri="{BB962C8B-B14F-4D97-AF65-F5344CB8AC3E}">
-        <p14:creationId xmlns:p14="http://schemas.microsoft.com/office/powerpoint/2010/main" val="2459266402"/>
+        <p14:creationId xmlns:p14="http://schemas.microsoft.com/office/powerpoint/2010/main" val="2956820930"/>
       </p:ext>
     </p:extLst>
   </p:cSld>
@@ -9748,20 +9580,20 @@
           <a:lstStyle/>
           <a:p>
             <a:r>
-              <a:rPr lang="de-DE" sz="5200" b="1">
+              <a:rPr lang="de-DE" sz="5200">
                 <a:latin typeface="Courier New" panose="02070309020205020404" pitchFamily="49" charset="0"/>
                 <a:cs typeface="Courier New" panose="02070309020205020404" pitchFamily="49" charset="0"/>
               </a:rPr>
               <a:t>h</a:t>
             </a:r>
             <a:r>
-              <a:rPr lang="de-DE" sz="5200" b="1" smtClean="0">
+              <a:rPr lang="de-DE" sz="5200" smtClean="0">
                 <a:latin typeface="Courier New" panose="02070309020205020404" pitchFamily="49" charset="0"/>
                 <a:cs typeface="Courier New" panose="02070309020205020404" pitchFamily="49" charset="0"/>
               </a:rPr>
               <a:t>ow to formulate and validate constraints?</a:t>
             </a:r>
-            <a:endParaRPr lang="en-US" sz="5200" b="1">
+            <a:endParaRPr lang="en-US" sz="5200">
               <a:latin typeface="Courier New" panose="02070309020205020404" pitchFamily="49" charset="0"/>
               <a:cs typeface="Courier New" panose="02070309020205020404" pitchFamily="49" charset="0"/>
             </a:endParaRPr>
@@ -9821,14 +9653,23 @@
           <a:lstStyle/>
           <a:p>
             <a:r>
-              <a:rPr lang="de-DE"/>
+              <a:rPr lang="de-DE">
+                <a:latin typeface="Courier New" panose="02070309020205020404" pitchFamily="49" charset="0"/>
+                <a:cs typeface="Courier New" panose="02070309020205020404" pitchFamily="49" charset="0"/>
+              </a:rPr>
               <a:t>c</a:t>
             </a:r>
             <a:r>
-              <a:rPr lang="de-DE" smtClean="0"/>
+              <a:rPr lang="de-DE" smtClean="0">
+                <a:latin typeface="Courier New" panose="02070309020205020404" pitchFamily="49" charset="0"/>
+                <a:cs typeface="Courier New" panose="02070309020205020404" pitchFamily="49" charset="0"/>
+              </a:rPr>
               <a:t>onstraint (DSP)</a:t>
             </a:r>
-            <a:endParaRPr lang="en-US"/>
+            <a:endParaRPr lang="en-US">
+              <a:latin typeface="Courier New" panose="02070309020205020404" pitchFamily="49" charset="0"/>
+              <a:cs typeface="Courier New" panose="02070309020205020404" pitchFamily="49" charset="0"/>
+            </a:endParaRPr>
           </a:p>
         </p:txBody>
       </p:sp>
@@ -10215,11 +10056,17 @@
               <a:buNone/>
             </a:pPr>
             <a:r>
-              <a:rPr lang="de-DE" sz="4400" smtClean="0"/>
+              <a:rPr lang="de-DE" sz="4400" smtClean="0">
+                <a:latin typeface="Courier New" panose="02070309020205020404" pitchFamily="49" charset="0"/>
+                <a:cs typeface="Courier New" panose="02070309020205020404" pitchFamily="49" charset="0"/>
+              </a:rPr>
               <a:t>invalid </a:t>
             </a:r>
             <a:r>
-              <a:rPr lang="de-DE" sz="4400"/>
+              <a:rPr lang="de-DE" sz="4400">
+                <a:latin typeface="Courier New" panose="02070309020205020404" pitchFamily="49" charset="0"/>
+                <a:cs typeface="Courier New" panose="02070309020205020404" pitchFamily="49" charset="0"/>
+              </a:rPr>
               <a:t>data</a:t>
             </a:r>
           </a:p>
@@ -10228,6 +10075,7 @@
               <a:buNone/>
             </a:pPr>
             <a:endParaRPr lang="en-US" sz="2000">
+              <a:latin typeface="Courier New" panose="02070309020205020404" pitchFamily="49" charset="0"/>
               <a:cs typeface="Courier New" panose="02070309020205020404" pitchFamily="49" charset="0"/>
             </a:endParaRPr>
           </a:p>
@@ -10359,14 +10207,37 @@
           <a:lstStyle/>
           <a:p>
             <a:r>
-              <a:rPr lang="de-DE"/>
+              <a:rPr lang="de-DE">
+                <a:latin typeface="Courier New" panose="02070309020205020404" pitchFamily="49" charset="0"/>
+                <a:cs typeface="Courier New" panose="02070309020205020404" pitchFamily="49" charset="0"/>
+              </a:rPr>
               <a:t>c</a:t>
             </a:r>
             <a:r>
-              <a:rPr lang="de-DE" smtClean="0"/>
-              <a:t>onstraint (OWL 2)</a:t>
-            </a:r>
-            <a:endParaRPr lang="en-US"/>
+              <a:rPr lang="de-DE" smtClean="0">
+                <a:latin typeface="Courier New" panose="02070309020205020404" pitchFamily="49" charset="0"/>
+                <a:cs typeface="Courier New" panose="02070309020205020404" pitchFamily="49" charset="0"/>
+              </a:rPr>
+              <a:t>onstraint (</a:t>
+            </a:r>
+            <a:r>
+              <a:rPr lang="de-DE" smtClean="0">
+                <a:latin typeface="Courier New" panose="02070309020205020404" pitchFamily="49" charset="0"/>
+                <a:cs typeface="Courier New" panose="02070309020205020404" pitchFamily="49" charset="0"/>
+              </a:rPr>
+              <a:t>OWL2</a:t>
+            </a:r>
+            <a:r>
+              <a:rPr lang="de-DE" smtClean="0">
+                <a:latin typeface="Courier New" panose="02070309020205020404" pitchFamily="49" charset="0"/>
+                <a:cs typeface="Courier New" panose="02070309020205020404" pitchFamily="49" charset="0"/>
+              </a:rPr>
+              <a:t>)</a:t>
+            </a:r>
+            <a:endParaRPr lang="en-US">
+              <a:latin typeface="Courier New" panose="02070309020205020404" pitchFamily="49" charset="0"/>
+              <a:cs typeface="Courier New" panose="02070309020205020404" pitchFamily="49" charset="0"/>
+            </a:endParaRPr>
           </a:p>
         </p:txBody>
       </p:sp>
@@ -10551,29 +10422,6 @@
       </p:grpSpPr>
       <p:sp>
         <p:nvSpPr>
-          <p:cNvPr id="4" name="Titel 3"/>
-          <p:cNvSpPr>
-            <a:spLocks noGrp="1"/>
-          </p:cNvSpPr>
-          <p:nvPr>
-            <p:ph type="title"/>
-          </p:nvPr>
-        </p:nvSpPr>
-        <p:spPr/>
-        <p:txBody>
-          <a:bodyPr/>
-          <a:lstStyle/>
-          <a:p>
-            <a:r>
-              <a:rPr lang="de-DE" smtClean="0"/>
-              <a:t>validation</a:t>
-            </a:r>
-            <a:endParaRPr lang="en-US"/>
-          </a:p>
-        </p:txBody>
-      </p:sp>
-      <p:sp>
-        <p:nvSpPr>
           <p:cNvPr id="5" name="Inhaltsplatzhalter 4"/>
           <p:cNvSpPr>
             <a:spLocks noGrp="1"/>
@@ -10584,7 +10432,7 @@
         </p:nvSpPr>
         <p:spPr>
           <a:xfrm>
-            <a:off x="179512" y="1600200"/>
+            <a:off x="179512" y="2143397"/>
             <a:ext cx="8784976" cy="4525963"/>
           </a:xfrm>
         </p:spPr>
@@ -10598,12 +10446,33 @@
               <a:buNone/>
             </a:pPr>
             <a:r>
-              <a:rPr lang="en-US" smtClean="0">
-                <a:latin typeface="Courier New" panose="02070309020205020404" pitchFamily="49" charset="0"/>
-                <a:cs typeface="Courier New" panose="02070309020205020404" pitchFamily="49" charset="0"/>
+              <a:rPr lang="de-DE" smtClean="0">
+                <a:latin typeface="Courier New" panose="02070309020205020404" pitchFamily="49" charset="0"/>
+                <a:cs typeface="Courier New" panose="02070309020205020404" pitchFamily="49" charset="0"/>
+              </a:rPr>
+              <a:t>validator</a:t>
+            </a:r>
+            <a:endParaRPr lang="en-US" smtClean="0">
+              <a:latin typeface="Courier New" panose="02070309020205020404" pitchFamily="49" charset="0"/>
+              <a:cs typeface="Courier New" panose="02070309020205020404" pitchFamily="49" charset="0"/>
+            </a:endParaRPr>
+          </a:p>
+          <a:p>
+            <a:pPr marL="0" indent="0" algn="ctr">
+              <a:buNone/>
+            </a:pPr>
+            <a:r>
+              <a:rPr lang="en-US">
+                <a:latin typeface="Courier New" panose="02070309020205020404" pitchFamily="49" charset="0"/>
+                <a:cs typeface="Courier New" panose="02070309020205020404" pitchFamily="49" charset="0"/>
+                <a:hlinkClick r:id="rId3"/>
               </a:rPr>
               <a:t>purl.org/net/rdfval-demo</a:t>
             </a:r>
+            <a:endParaRPr lang="en-US">
+              <a:latin typeface="Courier New" panose="02070309020205020404" pitchFamily="49" charset="0"/>
+              <a:cs typeface="Courier New" panose="02070309020205020404" pitchFamily="49" charset="0"/>
+            </a:endParaRPr>
           </a:p>
           <a:p>
             <a:pPr marL="0" indent="0" algn="ctr">
@@ -10614,12 +10483,99 @@
               <a:cs typeface="Courier New" panose="02070309020205020404" pitchFamily="49" charset="0"/>
             </a:endParaRPr>
           </a:p>
+          <a:p>
+            <a:pPr marL="0" indent="0" algn="ctr">
+              <a:buNone/>
+            </a:pPr>
+            <a:r>
+              <a:rPr lang="de-DE" smtClean="0">
+                <a:latin typeface="Courier New" panose="02070309020205020404" pitchFamily="49" charset="0"/>
+                <a:cs typeface="Courier New" panose="02070309020205020404" pitchFamily="49" charset="0"/>
+              </a:rPr>
+              <a:t>executable examples</a:t>
+            </a:r>
+          </a:p>
+          <a:p>
+            <a:pPr marL="0" indent="0" algn="ctr">
+              <a:buNone/>
+            </a:pPr>
+            <a:r>
+              <a:rPr lang="en-US" smtClean="0">
+                <a:latin typeface="Courier New" panose="02070309020205020404" pitchFamily="49" charset="0"/>
+                <a:cs typeface="Courier New" panose="02070309020205020404" pitchFamily="49" charset="0"/>
+                <a:hlinkClick r:id="rId4"/>
+              </a:rPr>
+              <a:t>R-68-REQUIRED-PROPERTIES</a:t>
+            </a:r>
+            <a:r>
+              <a:rPr lang="en-US" smtClean="0">
+                <a:latin typeface="Courier New" panose="02070309020205020404" pitchFamily="49" charset="0"/>
+                <a:cs typeface="Courier New" panose="02070309020205020404" pitchFamily="49" charset="0"/>
+                <a:hlinkClick r:id="rId5"/>
+              </a:rPr>
+              <a:t> </a:t>
+            </a:r>
+            <a:endParaRPr lang="en-US" smtClean="0">
+              <a:latin typeface="Courier New" panose="02070309020205020404" pitchFamily="49" charset="0"/>
+              <a:cs typeface="Courier New" panose="02070309020205020404" pitchFamily="49" charset="0"/>
+            </a:endParaRPr>
+          </a:p>
+          <a:p>
+            <a:pPr marL="0" indent="0" algn="ctr">
+              <a:buNone/>
+            </a:pPr>
+            <a:endParaRPr lang="de-DE" smtClean="0">
+              <a:latin typeface="Courier New" panose="02070309020205020404" pitchFamily="49" charset="0"/>
+              <a:cs typeface="Courier New" panose="02070309020205020404" pitchFamily="49" charset="0"/>
+            </a:endParaRPr>
+          </a:p>
+        </p:txBody>
+      </p:sp>
+      <p:sp>
+        <p:nvSpPr>
+          <p:cNvPr id="6" name="Titel 1"/>
+          <p:cNvSpPr>
+            <a:spLocks noGrp="1"/>
+          </p:cNvSpPr>
+          <p:nvPr>
+            <p:ph type="title"/>
+          </p:nvPr>
+        </p:nvSpPr>
+        <p:spPr>
+          <a:xfrm>
+            <a:off x="457200" y="274638"/>
+            <a:ext cx="8229600" cy="1143000"/>
+          </a:xfrm>
+        </p:spPr>
+        <p:txBody>
+          <a:bodyPr/>
+          <a:lstStyle/>
+          <a:p>
+            <a:r>
+              <a:rPr lang="de-DE">
+                <a:latin typeface="Courier New" panose="02070309020205020404" pitchFamily="49" charset="0"/>
+                <a:cs typeface="Courier New" panose="02070309020205020404" pitchFamily="49" charset="0"/>
+              </a:rPr>
+              <a:t>v</a:t>
+            </a:r>
+            <a:r>
+              <a:rPr lang="de-DE" smtClean="0">
+                <a:latin typeface="Courier New" panose="02070309020205020404" pitchFamily="49" charset="0"/>
+                <a:cs typeface="Courier New" panose="02070309020205020404" pitchFamily="49" charset="0"/>
+              </a:rPr>
+              <a:t>alidation (DSP, OWL2)</a:t>
+            </a:r>
+            <a:endParaRPr lang="en-US">
+              <a:latin typeface="Courier New" panose="02070309020205020404" pitchFamily="49" charset="0"/>
+              <a:cs typeface="Courier New" panose="02070309020205020404" pitchFamily="49" charset="0"/>
+            </a:endParaRPr>
+          </a:p>
         </p:txBody>
       </p:sp>
     </p:spTree>
     <p:extLst>
       <p:ext uri="{BB962C8B-B14F-4D97-AF65-F5344CB8AC3E}">
-        <p14:creationId xmlns:p14="http://schemas.microsoft.com/office/powerpoint/2010/main" val="627033425"/>
+        <p14:creationId xmlns:p14="http://schemas.microsoft.com/office/powerpoint/2010/main" val="3855760255"/>
       </p:ext>
     </p:extLst>
   </p:cSld>
@@ -10655,7 +10611,7 @@
       </p:grpSpPr>
       <p:sp>
         <p:nvSpPr>
-          <p:cNvPr id="4" name="Titel 3"/>
+          <p:cNvPr id="2" name="Titel 1"/>
           <p:cNvSpPr>
             <a:spLocks noGrp="1"/>
           </p:cNvSpPr>
@@ -10665,28 +10621,75 @@
         </p:nvSpPr>
         <p:spPr>
           <a:xfrm>
-            <a:off x="0" y="1556792"/>
-            <a:ext cx="9144000" cy="1143000"/>
+            <a:off x="457200" y="1637928"/>
+            <a:ext cx="8229600" cy="1143000"/>
           </a:xfrm>
         </p:spPr>
         <p:txBody>
           <a:bodyPr>
-            <a:normAutofit fontScale="90000"/>
+            <a:noAutofit/>
           </a:bodyPr>
           <a:lstStyle/>
           <a:p>
             <a:r>
-              <a:rPr lang="en-US" sz="5200" smtClean="0"/>
+              <a:rPr lang="en-US" sz="4800" smtClean="0">
+                <a:latin typeface="Courier New" panose="02070309020205020404" pitchFamily="49" charset="0"/>
+                <a:cs typeface="Courier New" panose="02070309020205020404" pitchFamily="49" charset="0"/>
+                <a:hlinkClick r:id="rId2"/>
+              </a:rPr>
               <a:t>R-13-DISJOINT-GROUP-OF-PROPERTIES-CLASS-SPECIFIC</a:t>
             </a:r>
-            <a:endParaRPr lang="en-US" sz="5200"/>
+            <a:endParaRPr lang="en-US" sz="4700">
+              <a:latin typeface="Courier New" panose="02070309020205020404" pitchFamily="49" charset="0"/>
+              <a:cs typeface="Courier New" panose="02070309020205020404" pitchFamily="49" charset="0"/>
+            </a:endParaRPr>
+          </a:p>
+        </p:txBody>
+      </p:sp>
+      <p:sp>
+        <p:nvSpPr>
+          <p:cNvPr id="3" name="Inhaltsplatzhalter 2"/>
+          <p:cNvSpPr>
+            <a:spLocks noGrp="1"/>
+          </p:cNvSpPr>
+          <p:nvPr>
+            <p:ph idx="1"/>
+          </p:nvPr>
+        </p:nvSpPr>
+        <p:spPr>
+          <a:xfrm>
+            <a:off x="457200" y="4476253"/>
+            <a:ext cx="8229600" cy="2193107"/>
+          </a:xfrm>
+        </p:spPr>
+        <p:txBody>
+          <a:bodyPr/>
+          <a:lstStyle/>
+          <a:p>
+            <a:pPr marL="0" indent="0" algn="ctr">
+              <a:buNone/>
+            </a:pPr>
+            <a:r>
+              <a:rPr lang="en-US" smtClean="0">
+                <a:latin typeface="Courier New" panose="02070309020205020404" pitchFamily="49" charset="0"/>
+                <a:cs typeface="Courier New" panose="02070309020205020404" pitchFamily="49" charset="0"/>
+              </a:rPr>
+              <a:t>ShEx, SPIN</a:t>
+            </a:r>
+            <a:r>
+              <a:rPr lang="en-US">
+                <a:latin typeface="Courier New" panose="02070309020205020404" pitchFamily="49" charset="0"/>
+                <a:cs typeface="Courier New" panose="02070309020205020404" pitchFamily="49" charset="0"/>
+              </a:rPr>
+              <a:t>, SPARQL</a:t>
+            </a:r>
           </a:p>
         </p:txBody>
       </p:sp>
     </p:spTree>
     <p:extLst>
       <p:ext uri="{BB962C8B-B14F-4D97-AF65-F5344CB8AC3E}">
-        <p14:creationId xmlns:p14="http://schemas.microsoft.com/office/powerpoint/2010/main" val="3223630083"/>
+        <p14:creationId xmlns:p14="http://schemas.microsoft.com/office/powerpoint/2010/main" val="3276180879"/>
       </p:ext>
     </p:extLst>
   </p:cSld>
@@ -10736,14 +10739,23 @@
           <a:lstStyle/>
           <a:p>
             <a:r>
-              <a:rPr lang="de-DE"/>
+              <a:rPr lang="de-DE">
+                <a:latin typeface="Courier New" panose="02070309020205020404" pitchFamily="49" charset="0"/>
+                <a:cs typeface="Courier New" panose="02070309020205020404" pitchFamily="49" charset="0"/>
+              </a:rPr>
               <a:t>c</a:t>
             </a:r>
             <a:r>
-              <a:rPr lang="de-DE" smtClean="0"/>
+              <a:rPr lang="de-DE" smtClean="0">
+                <a:latin typeface="Courier New" panose="02070309020205020404" pitchFamily="49" charset="0"/>
+                <a:cs typeface="Courier New" panose="02070309020205020404" pitchFamily="49" charset="0"/>
+              </a:rPr>
               <a:t>onstraint (ShEx)</a:t>
             </a:r>
-            <a:endParaRPr lang="en-US"/>
+            <a:endParaRPr lang="en-US">
+              <a:latin typeface="Courier New" panose="02070309020205020404" pitchFamily="49" charset="0"/>
+              <a:cs typeface="Courier New" panose="02070309020205020404" pitchFamily="49" charset="0"/>
+            </a:endParaRPr>
           </a:p>
         </p:txBody>
       </p:sp>
@@ -10973,19 +10985,22 @@
             </a:pPr>
             <a:r>
               <a:rPr lang="en-US" sz="4400" smtClean="0">
-                <a:latin typeface="+mj-lt"/>
+                <a:latin typeface="Courier New" panose="02070309020205020404" pitchFamily="49" charset="0"/>
+                <a:cs typeface="Courier New" panose="02070309020205020404" pitchFamily="49" charset="0"/>
               </a:rPr>
               <a:t>matching </a:t>
             </a:r>
             <a:r>
               <a:rPr lang="en-US" sz="4400">
-                <a:latin typeface="+mj-lt"/>
+                <a:latin typeface="Courier New" panose="02070309020205020404" pitchFamily="49" charset="0"/>
+                <a:cs typeface="Courier New" panose="02070309020205020404" pitchFamily="49" charset="0"/>
               </a:rPr>
               <a:t>'Human' </a:t>
             </a:r>
             <a:r>
               <a:rPr lang="en-US" sz="4400" smtClean="0">
-                <a:latin typeface="+mj-lt"/>
+                <a:latin typeface="Courier New" panose="02070309020205020404" pitchFamily="49" charset="0"/>
+                <a:cs typeface="Courier New" panose="02070309020205020404" pitchFamily="49" charset="0"/>
               </a:rPr>
               <a:t>shape</a:t>
             </a:r>
@@ -10995,7 +11010,7 @@
               <a:buNone/>
             </a:pPr>
             <a:endParaRPr lang="en-US" sz="2000" smtClean="0">
-              <a:latin typeface="+mj-lt"/>
+              <a:latin typeface="Courier New" panose="02070309020205020404" pitchFamily="49" charset="0"/>
               <a:cs typeface="Courier New" panose="02070309020205020404" pitchFamily="49" charset="0"/>
             </a:endParaRPr>
           </a:p>
@@ -11008,7 +11023,7 @@
                 <a:latin typeface="Courier New" panose="02070309020205020404" pitchFamily="49" charset="0"/>
                 <a:cs typeface="Courier New" panose="02070309020205020404" pitchFamily="49" charset="0"/>
               </a:rPr>
-              <a:t>:Anakin</a:t>
+              <a:t>:Luke</a:t>
             </a:r>
           </a:p>
           <a:p>
@@ -11020,7 +11035,7 @@
                 <a:latin typeface="Courier New" panose="02070309020205020404" pitchFamily="49" charset="0"/>
                 <a:cs typeface="Courier New" panose="02070309020205020404" pitchFamily="49" charset="0"/>
               </a:rPr>
-              <a:t>    foaf:givenName "Anakin" ;</a:t>
+              <a:t>    foaf:givenName "Luke" ;</a:t>
             </a:r>
           </a:p>
           <a:p>
@@ -11032,7 +11047,14 @@
                 <a:latin typeface="Courier New" panose="02070309020205020404" pitchFamily="49" charset="0"/>
                 <a:cs typeface="Courier New" panose="02070309020205020404" pitchFamily="49" charset="0"/>
               </a:rPr>
-              <a:t>    foaf:familyName "Skywalker" </a:t>
+              <a:t>    foaf:familyName "Skywalker</a:t>
+            </a:r>
+            <a:r>
+              <a:rPr lang="en-US" sz="2000">
+                <a:latin typeface="Courier New" panose="02070309020205020404" pitchFamily="49" charset="0"/>
+                <a:cs typeface="Courier New" panose="02070309020205020404" pitchFamily="49" charset="0"/>
+              </a:rPr>
+              <a:t>" </a:t>
             </a:r>
             <a:r>
               <a:rPr lang="en-US" sz="2000" smtClean="0">
@@ -11081,7 +11103,7 @@
                 <a:latin typeface="Courier New" panose="02070309020205020404" pitchFamily="49" charset="0"/>
                 <a:cs typeface="Courier New" panose="02070309020205020404" pitchFamily="49" charset="0"/>
               </a:rPr>
-              <a:t>:Anakin</a:t>
+              <a:t>:Leia</a:t>
             </a:r>
           </a:p>
           <a:p>
@@ -11093,7 +11115,7 @@
                 <a:latin typeface="Courier New" panose="02070309020205020404" pitchFamily="49" charset="0"/>
                 <a:cs typeface="Courier New" panose="02070309020205020404" pitchFamily="49" charset="0"/>
               </a:rPr>
-              <a:t>    foaf:name "Anakin Skywalker" .</a:t>
+              <a:t>    foaf:name "Leia Skywalker" .</a:t>
             </a:r>
             <a:endParaRPr lang="en-US" sz="2000" smtClean="0">
               <a:latin typeface="Courier New" panose="02070309020205020404" pitchFamily="49" charset="0"/>
@@ -11151,8 +11173,8 @@
         </p:nvSpPr>
         <p:spPr>
           <a:xfrm>
-            <a:off x="457200" y="476672"/>
-            <a:ext cx="8229600" cy="5649491"/>
+            <a:off x="107504" y="476672"/>
+            <a:ext cx="8856984" cy="5649491"/>
           </a:xfrm>
         </p:spPr>
         <p:txBody>
@@ -11165,20 +11187,23 @@
               <a:buNone/>
             </a:pPr>
             <a:r>
-              <a:rPr lang="en-US" sz="4400" smtClean="0">
-                <a:latin typeface="+mj-lt"/>
+              <a:rPr lang="en-US" sz="4300" smtClean="0">
+                <a:latin typeface="Courier New" panose="02070309020205020404" pitchFamily="49" charset="0"/>
+                <a:cs typeface="Courier New" panose="02070309020205020404" pitchFamily="49" charset="0"/>
               </a:rPr>
               <a:t>NOT matching </a:t>
             </a:r>
             <a:r>
-              <a:rPr lang="en-US" sz="4400">
-                <a:latin typeface="+mj-lt"/>
+              <a:rPr lang="en-US" sz="4300">
+                <a:latin typeface="Courier New" panose="02070309020205020404" pitchFamily="49" charset="0"/>
+                <a:cs typeface="Courier New" panose="02070309020205020404" pitchFamily="49" charset="0"/>
               </a:rPr>
               <a:t>'Human' </a:t>
             </a:r>
             <a:r>
-              <a:rPr lang="en-US" sz="4400" smtClean="0">
-                <a:latin typeface="+mj-lt"/>
+              <a:rPr lang="en-US" sz="4300" smtClean="0">
+                <a:latin typeface="Courier New" panose="02070309020205020404" pitchFamily="49" charset="0"/>
+                <a:cs typeface="Courier New" panose="02070309020205020404" pitchFamily="49" charset="0"/>
               </a:rPr>
               <a:t>shape</a:t>
             </a:r>
@@ -11188,7 +11213,7 @@
               <a:buNone/>
             </a:pPr>
             <a:endParaRPr lang="en-US" sz="2000" smtClean="0">
-              <a:latin typeface="+mj-lt"/>
+              <a:latin typeface="Courier New" panose="02070309020205020404" pitchFamily="49" charset="0"/>
               <a:cs typeface="Courier New" panose="02070309020205020404" pitchFamily="49" charset="0"/>
             </a:endParaRPr>
           </a:p>
@@ -11285,29 +11310,6 @@
       </p:grpSpPr>
       <p:sp>
         <p:nvSpPr>
-          <p:cNvPr id="4" name="Titel 3"/>
-          <p:cNvSpPr>
-            <a:spLocks noGrp="1"/>
-          </p:cNvSpPr>
-          <p:nvPr>
-            <p:ph type="title"/>
-          </p:nvPr>
-        </p:nvSpPr>
-        <p:spPr/>
-        <p:txBody>
-          <a:bodyPr/>
-          <a:lstStyle/>
-          <a:p>
-            <a:r>
-              <a:rPr lang="de-DE" smtClean="0"/>
-              <a:t>validation</a:t>
-            </a:r>
-            <a:endParaRPr lang="en-US"/>
-          </a:p>
-        </p:txBody>
-      </p:sp>
-      <p:sp>
-        <p:nvSpPr>
           <p:cNvPr id="5" name="Inhaltsplatzhalter 4"/>
           <p:cNvSpPr>
             <a:spLocks noGrp="1"/>
@@ -11318,7 +11320,7 @@
         </p:nvSpPr>
         <p:spPr>
           <a:xfrm>
-            <a:off x="179512" y="1600200"/>
+            <a:off x="179512" y="2143397"/>
             <a:ext cx="8784976" cy="4525963"/>
           </a:xfrm>
         </p:spPr>
@@ -11332,12 +11334,79 @@
               <a:buNone/>
             </a:pPr>
             <a:r>
+              <a:rPr lang="de-DE" smtClean="0">
+                <a:latin typeface="Courier New" panose="02070309020205020404" pitchFamily="49" charset="0"/>
+                <a:cs typeface="Courier New" panose="02070309020205020404" pitchFamily="49" charset="0"/>
+              </a:rPr>
+              <a:t>validator</a:t>
+            </a:r>
+            <a:endParaRPr lang="en-US" smtClean="0">
+              <a:latin typeface="Courier New" panose="02070309020205020404" pitchFamily="49" charset="0"/>
+              <a:cs typeface="Courier New" panose="02070309020205020404" pitchFamily="49" charset="0"/>
+            </a:endParaRPr>
+          </a:p>
+          <a:p>
+            <a:pPr marL="0" indent="0" algn="ctr">
+              <a:buNone/>
+            </a:pPr>
+            <a:r>
               <a:rPr lang="en-US" smtClean="0">
                 <a:latin typeface="Courier New" panose="02070309020205020404" pitchFamily="49" charset="0"/>
                 <a:cs typeface="Courier New" panose="02070309020205020404" pitchFamily="49" charset="0"/>
+                <a:hlinkClick r:id="rId3"/>
               </a:rPr>
               <a:t>www.w3.org/2013/ShEx/FancyShExDemo</a:t>
             </a:r>
+            <a:endParaRPr lang="en-US">
+              <a:latin typeface="Courier New" panose="02070309020205020404" pitchFamily="49" charset="0"/>
+              <a:cs typeface="Courier New" panose="02070309020205020404" pitchFamily="49" charset="0"/>
+            </a:endParaRPr>
+          </a:p>
+          <a:p>
+            <a:pPr marL="0" indent="0" algn="ctr">
+              <a:buNone/>
+            </a:pPr>
+            <a:endParaRPr lang="de-DE">
+              <a:latin typeface="Courier New" panose="02070309020205020404" pitchFamily="49" charset="0"/>
+              <a:cs typeface="Courier New" panose="02070309020205020404" pitchFamily="49" charset="0"/>
+            </a:endParaRPr>
+          </a:p>
+          <a:p>
+            <a:pPr marL="0" indent="0" algn="ctr">
+              <a:buNone/>
+            </a:pPr>
+            <a:r>
+              <a:rPr lang="de-DE" smtClean="0">
+                <a:latin typeface="Courier New" panose="02070309020205020404" pitchFamily="49" charset="0"/>
+                <a:cs typeface="Courier New" panose="02070309020205020404" pitchFamily="49" charset="0"/>
+              </a:rPr>
+              <a:t>executable examples</a:t>
+            </a:r>
+          </a:p>
+          <a:p>
+            <a:pPr marL="0" indent="0" algn="ctr">
+              <a:buNone/>
+            </a:pPr>
+            <a:r>
+              <a:rPr lang="en-US" smtClean="0">
+                <a:latin typeface="Courier New" panose="02070309020205020404" pitchFamily="49" charset="0"/>
+                <a:cs typeface="Courier New" panose="02070309020205020404" pitchFamily="49" charset="0"/>
+                <a:hlinkClick r:id="rId4"/>
+              </a:rPr>
+              <a:t>R-13-DISJOINT-GROUP-OF-PROPERTIES-CLASS-SPECIFIC</a:t>
+            </a:r>
+            <a:r>
+              <a:rPr lang="en-US" smtClean="0">
+                <a:latin typeface="Courier New" panose="02070309020205020404" pitchFamily="49" charset="0"/>
+                <a:cs typeface="Courier New" panose="02070309020205020404" pitchFamily="49" charset="0"/>
+                <a:hlinkClick r:id="rId4"/>
+              </a:rPr>
+              <a:t> </a:t>
+            </a:r>
+            <a:endParaRPr lang="en-US" smtClean="0">
+              <a:latin typeface="Courier New" panose="02070309020205020404" pitchFamily="49" charset="0"/>
+              <a:cs typeface="Courier New" panose="02070309020205020404" pitchFamily="49" charset="0"/>
+            </a:endParaRPr>
           </a:p>
           <a:p>
             <a:pPr marL="0" indent="0" algn="ctr">
@@ -11350,10 +11419,51 @@
           </a:p>
         </p:txBody>
       </p:sp>
+      <p:sp>
+        <p:nvSpPr>
+          <p:cNvPr id="6" name="Titel 1"/>
+          <p:cNvSpPr>
+            <a:spLocks noGrp="1"/>
+          </p:cNvSpPr>
+          <p:nvPr>
+            <p:ph type="title"/>
+          </p:nvPr>
+        </p:nvSpPr>
+        <p:spPr>
+          <a:xfrm>
+            <a:off x="457200" y="274638"/>
+            <a:ext cx="8229600" cy="1143000"/>
+          </a:xfrm>
+        </p:spPr>
+        <p:txBody>
+          <a:bodyPr/>
+          <a:lstStyle/>
+          <a:p>
+            <a:r>
+              <a:rPr lang="de-DE">
+                <a:latin typeface="Courier New" panose="02070309020205020404" pitchFamily="49" charset="0"/>
+                <a:cs typeface="Courier New" panose="02070309020205020404" pitchFamily="49" charset="0"/>
+              </a:rPr>
+              <a:t>v</a:t>
+            </a:r>
+            <a:r>
+              <a:rPr lang="de-DE" smtClean="0">
+                <a:latin typeface="Courier New" panose="02070309020205020404" pitchFamily="49" charset="0"/>
+                <a:cs typeface="Courier New" panose="02070309020205020404" pitchFamily="49" charset="0"/>
+              </a:rPr>
+              <a:t>alidation (DSP, OWL2)</a:t>
+            </a:r>
+            <a:endParaRPr lang="en-US">
+              <a:latin typeface="Courier New" panose="02070309020205020404" pitchFamily="49" charset="0"/>
+              <a:cs typeface="Courier New" panose="02070309020205020404" pitchFamily="49" charset="0"/>
+            </a:endParaRPr>
+          </a:p>
+        </p:txBody>
+      </p:sp>
     </p:spTree>
     <p:extLst>
       <p:ext uri="{BB962C8B-B14F-4D97-AF65-F5344CB8AC3E}">
-        <p14:creationId xmlns:p14="http://schemas.microsoft.com/office/powerpoint/2010/main" val="3978385542"/>
+        <p14:creationId xmlns:p14="http://schemas.microsoft.com/office/powerpoint/2010/main" val="2862947780"/>
       </p:ext>
     </p:extLst>
   </p:cSld>
@@ -11411,11 +11521,16 @@
           <a:p>
             <a:r>
               <a:rPr lang="en-US" sz="4800" smtClean="0">
+                <a:latin typeface="Courier New" panose="02070309020205020404" pitchFamily="49" charset="0"/>
+                <a:cs typeface="Courier New" panose="02070309020205020404" pitchFamily="49" charset="0"/>
                 <a:hlinkClick r:id="rId2"/>
               </a:rPr>
               <a:t>R-38-DEFAULT-VALUES-OF-RDF-LITERALS</a:t>
             </a:r>
-            <a:endParaRPr lang="en-US" sz="4700"/>
+            <a:endParaRPr lang="en-US" sz="4700">
+              <a:latin typeface="Courier New" panose="02070309020205020404" pitchFamily="49" charset="0"/>
+              <a:cs typeface="Courier New" panose="02070309020205020404" pitchFamily="49" charset="0"/>
+            </a:endParaRPr>
           </a:p>
         </p:txBody>
       </p:sp>
@@ -11443,11 +11558,17 @@
               <a:buNone/>
             </a:pPr>
             <a:r>
-              <a:rPr lang="en-US" smtClean="0"/>
+              <a:rPr lang="en-US" smtClean="0">
+                <a:latin typeface="Courier New" panose="02070309020205020404" pitchFamily="49" charset="0"/>
+                <a:cs typeface="Courier New" panose="02070309020205020404" pitchFamily="49" charset="0"/>
+              </a:rPr>
               <a:t>SPIN</a:t>
             </a:r>
             <a:r>
-              <a:rPr lang="en-US"/>
+              <a:rPr lang="en-US">
+                <a:latin typeface="Courier New" panose="02070309020205020404" pitchFamily="49" charset="0"/>
+                <a:cs typeface="Courier New" panose="02070309020205020404" pitchFamily="49" charset="0"/>
+              </a:rPr>
               <a:t>, SPARQL</a:t>
             </a:r>
           </a:p>
@@ -11555,14 +11676,7 @@
                 <a:latin typeface="Courier New" panose="02070309020205020404" pitchFamily="49" charset="0"/>
                 <a:cs typeface="Courier New" panose="02070309020205020404" pitchFamily="49" charset="0"/>
               </a:rPr>
-              <a:t>DSP, OWL 2, </a:t>
-            </a:r>
-            <a:r>
-              <a:rPr lang="en-US" smtClean="0">
-                <a:latin typeface="Courier New" panose="02070309020205020404" pitchFamily="49" charset="0"/>
-                <a:cs typeface="Courier New" panose="02070309020205020404" pitchFamily="49" charset="0"/>
-              </a:rPr>
-              <a:t>SPIN</a:t>
+              <a:t>DSP, OWL 2, SPIN</a:t>
             </a:r>
             <a:r>
               <a:rPr lang="en-US">
@@ -11627,14 +11741,23 @@
           <a:lstStyle/>
           <a:p>
             <a:r>
-              <a:rPr lang="de-DE"/>
+              <a:rPr lang="de-DE">
+                <a:latin typeface="Courier New" panose="02070309020205020404" pitchFamily="49" charset="0"/>
+                <a:cs typeface="Courier New" panose="02070309020205020404" pitchFamily="49" charset="0"/>
+              </a:rPr>
               <a:t>c</a:t>
             </a:r>
             <a:r>
-              <a:rPr lang="de-DE" smtClean="0"/>
+              <a:rPr lang="de-DE" smtClean="0">
+                <a:latin typeface="Courier New" panose="02070309020205020404" pitchFamily="49" charset="0"/>
+                <a:cs typeface="Courier New" panose="02070309020205020404" pitchFamily="49" charset="0"/>
+              </a:rPr>
               <a:t>onstraint (SPIN)</a:t>
             </a:r>
-            <a:endParaRPr lang="en-US"/>
+            <a:endParaRPr lang="en-US">
+              <a:latin typeface="Courier New" panose="02070309020205020404" pitchFamily="49" charset="0"/>
+              <a:cs typeface="Courier New" panose="02070309020205020404" pitchFamily="49" charset="0"/>
+            </a:endParaRPr>
           </a:p>
         </p:txBody>
       </p:sp>
@@ -12049,7 +12172,7 @@
               <a:buNone/>
             </a:pPr>
             <a:r>
-              <a:rPr lang="de-DE" b="1" smtClean="0">
+              <a:rPr lang="de-DE" sz="4000" smtClean="0">
                 <a:latin typeface="Courier New" panose="02070309020205020404" pitchFamily="49" charset="0"/>
                 <a:cs typeface="Courier New" panose="02070309020205020404" pitchFamily="49" charset="0"/>
               </a:rPr>
@@ -12137,14 +12260,14 @@
               <a:buNone/>
             </a:pPr>
             <a:r>
-              <a:rPr lang="de-DE" sz="2800" b="1">
+              <a:rPr lang="de-DE" sz="4000">
                 <a:latin typeface="Courier New" panose="02070309020205020404" pitchFamily="49" charset="0"/>
                 <a:cs typeface="Courier New" panose="02070309020205020404" pitchFamily="49" charset="0"/>
               </a:rPr>
               <a:t>i</a:t>
             </a:r>
             <a:r>
-              <a:rPr lang="de-DE" sz="2800" b="1" smtClean="0">
+              <a:rPr lang="de-DE" sz="4000" smtClean="0">
                 <a:latin typeface="Courier New" panose="02070309020205020404" pitchFamily="49" charset="0"/>
                 <a:cs typeface="Courier New" panose="02070309020205020404" pitchFamily="49" charset="0"/>
               </a:rPr>
@@ -12276,14 +12399,23 @@
           <a:lstStyle/>
           <a:p>
             <a:r>
-              <a:rPr lang="de-DE"/>
+              <a:rPr lang="de-DE">
+                <a:latin typeface="Courier New" panose="02070309020205020404" pitchFamily="49" charset="0"/>
+                <a:cs typeface="Courier New" panose="02070309020205020404" pitchFamily="49" charset="0"/>
+              </a:rPr>
               <a:t>c</a:t>
             </a:r>
             <a:r>
-              <a:rPr lang="de-DE" smtClean="0"/>
+              <a:rPr lang="de-DE" smtClean="0">
+                <a:latin typeface="Courier New" panose="02070309020205020404" pitchFamily="49" charset="0"/>
+                <a:cs typeface="Courier New" panose="02070309020205020404" pitchFamily="49" charset="0"/>
+              </a:rPr>
               <a:t>onstraint (SPIN)</a:t>
             </a:r>
-            <a:endParaRPr lang="en-US"/>
+            <a:endParaRPr lang="en-US">
+              <a:latin typeface="Courier New" panose="02070309020205020404" pitchFamily="49" charset="0"/>
+              <a:cs typeface="Courier New" panose="02070309020205020404" pitchFamily="49" charset="0"/>
+            </a:endParaRPr>
           </a:p>
         </p:txBody>
       </p:sp>
@@ -12698,7 +12830,7 @@
               <a:buNone/>
             </a:pPr>
             <a:r>
-              <a:rPr lang="de-DE" b="1" smtClean="0">
+              <a:rPr lang="de-DE" sz="4000" smtClean="0">
                 <a:latin typeface="Courier New" panose="02070309020205020404" pitchFamily="49" charset="0"/>
                 <a:cs typeface="Courier New" panose="02070309020205020404" pitchFamily="49" charset="0"/>
               </a:rPr>
@@ -12768,14 +12900,14 @@
               <a:buNone/>
             </a:pPr>
             <a:r>
-              <a:rPr lang="de-DE" sz="2800" b="1">
+              <a:rPr lang="de-DE" sz="4000">
                 <a:latin typeface="Courier New" panose="02070309020205020404" pitchFamily="49" charset="0"/>
                 <a:cs typeface="Courier New" panose="02070309020205020404" pitchFamily="49" charset="0"/>
               </a:rPr>
               <a:t>i</a:t>
             </a:r>
             <a:r>
-              <a:rPr lang="de-DE" sz="2800" b="1" smtClean="0">
+              <a:rPr lang="de-DE" sz="4000" smtClean="0">
                 <a:latin typeface="Courier New" panose="02070309020205020404" pitchFamily="49" charset="0"/>
                 <a:cs typeface="Courier New" panose="02070309020205020404" pitchFamily="49" charset="0"/>
               </a:rPr>
@@ -12932,10 +13064,6 @@
               </a:rPr>
               <a:t>examples</a:t>
             </a:r>
-            <a:endParaRPr lang="de-DE" smtClean="0">
-              <a:latin typeface="Courier New" panose="02070309020205020404" pitchFamily="49" charset="0"/>
-              <a:cs typeface="Courier New" panose="02070309020205020404" pitchFamily="49" charset="0"/>
-            </a:endParaRPr>
           </a:p>
           <a:p>
             <a:pPr marL="0" indent="0" algn="ctr">
@@ -12994,10 +13122,30 @@
           <a:lstStyle/>
           <a:p>
             <a:r>
-              <a:rPr lang="de-DE" smtClean="0"/>
-              <a:t>Validation (SPIN)</a:t>
-            </a:r>
-            <a:endParaRPr lang="en-US"/>
+              <a:rPr lang="de-DE">
+                <a:latin typeface="Courier New" panose="02070309020205020404" pitchFamily="49" charset="0"/>
+                <a:cs typeface="Courier New" panose="02070309020205020404" pitchFamily="49" charset="0"/>
+              </a:rPr>
+              <a:t>v</a:t>
+            </a:r>
+            <a:r>
+              <a:rPr lang="de-DE" smtClean="0">
+                <a:latin typeface="Courier New" panose="02070309020205020404" pitchFamily="49" charset="0"/>
+                <a:cs typeface="Courier New" panose="02070309020205020404" pitchFamily="49" charset="0"/>
+              </a:rPr>
+              <a:t>alidation </a:t>
+            </a:r>
+            <a:r>
+              <a:rPr lang="de-DE" smtClean="0">
+                <a:latin typeface="Courier New" panose="02070309020205020404" pitchFamily="49" charset="0"/>
+                <a:cs typeface="Courier New" panose="02070309020205020404" pitchFamily="49" charset="0"/>
+              </a:rPr>
+              <a:t>(SPIN)</a:t>
+            </a:r>
+            <a:endParaRPr lang="en-US">
+              <a:latin typeface="Courier New" panose="02070309020205020404" pitchFamily="49" charset="0"/>
+              <a:cs typeface="Courier New" panose="02070309020205020404" pitchFamily="49" charset="0"/>
+            </a:endParaRPr>
           </a:p>
         </p:txBody>
       </p:sp>
@@ -13062,11 +13210,16 @@
           <a:p>
             <a:r>
               <a:rPr lang="en-US" sz="4800">
+                <a:latin typeface="Courier New" panose="02070309020205020404" pitchFamily="49" charset="0"/>
+                <a:cs typeface="Courier New" panose="02070309020205020404" pitchFamily="49" charset="0"/>
                 <a:hlinkClick r:id="rId2"/>
               </a:rPr>
               <a:t>R-52-NEGATIVE-OBJECT-PROPERTY-CONSTRAINTS</a:t>
             </a:r>
-            <a:endParaRPr lang="en-US" sz="4700"/>
+            <a:endParaRPr lang="en-US" sz="4700">
+              <a:latin typeface="Courier New" panose="02070309020205020404" pitchFamily="49" charset="0"/>
+              <a:cs typeface="Courier New" panose="02070309020205020404" pitchFamily="49" charset="0"/>
+            </a:endParaRPr>
           </a:p>
         </p:txBody>
       </p:sp>
@@ -13094,7 +13247,10 @@
               <a:buNone/>
             </a:pPr>
             <a:r>
-              <a:rPr lang="en-US"/>
+              <a:rPr lang="en-US">
+                <a:latin typeface="Courier New" panose="02070309020205020404" pitchFamily="49" charset="0"/>
+                <a:cs typeface="Courier New" panose="02070309020205020404" pitchFamily="49" charset="0"/>
+              </a:rPr>
               <a:t>ShEx, SPIN, SPARQL</a:t>
             </a:r>
           </a:p>
@@ -13153,14 +13309,23 @@
           <a:lstStyle/>
           <a:p>
             <a:r>
-              <a:rPr lang="de-DE"/>
+              <a:rPr lang="de-DE">
+                <a:latin typeface="Courier New" panose="02070309020205020404" pitchFamily="49" charset="0"/>
+                <a:cs typeface="Courier New" panose="02070309020205020404" pitchFamily="49" charset="0"/>
+              </a:rPr>
               <a:t>c</a:t>
             </a:r>
             <a:r>
-              <a:rPr lang="de-DE" smtClean="0"/>
+              <a:rPr lang="de-DE" smtClean="0">
+                <a:latin typeface="Courier New" panose="02070309020205020404" pitchFamily="49" charset="0"/>
+                <a:cs typeface="Courier New" panose="02070309020205020404" pitchFamily="49" charset="0"/>
+              </a:rPr>
               <a:t>onstraint (ShEx)</a:t>
             </a:r>
-            <a:endParaRPr lang="en-US"/>
+            <a:endParaRPr lang="en-US">
+              <a:latin typeface="Courier New" panose="02070309020205020404" pitchFamily="49" charset="0"/>
+              <a:cs typeface="Courier New" panose="02070309020205020404" pitchFamily="49" charset="0"/>
+            </a:endParaRPr>
           </a:p>
         </p:txBody>
       </p:sp>
@@ -13391,8 +13556,8 @@
         </p:nvSpPr>
         <p:spPr>
           <a:xfrm>
-            <a:off x="457200" y="476672"/>
-            <a:ext cx="8229600" cy="5649491"/>
+            <a:off x="251520" y="476672"/>
+            <a:ext cx="8568952" cy="5649491"/>
           </a:xfrm>
         </p:spPr>
         <p:txBody>
@@ -13405,20 +13570,23 @@
               <a:buNone/>
             </a:pPr>
             <a:r>
-              <a:rPr lang="en-US" sz="4400" smtClean="0">
-                <a:latin typeface="+mj-lt"/>
+              <a:rPr lang="en-US" sz="4000" smtClean="0">
+                <a:latin typeface="Courier New" panose="02070309020205020404" pitchFamily="49" charset="0"/>
+                <a:cs typeface="Courier New" panose="02070309020205020404" pitchFamily="49" charset="0"/>
               </a:rPr>
               <a:t>matching '</a:t>
             </a:r>
             <a:r>
-              <a:rPr lang="en-US" sz="4400">
-                <a:latin typeface="+mj-lt"/>
+              <a:rPr lang="en-US" sz="4000">
+                <a:latin typeface="Courier New" panose="02070309020205020404" pitchFamily="49" charset="0"/>
+                <a:cs typeface="Courier New" panose="02070309020205020404" pitchFamily="49" charset="0"/>
               </a:rPr>
               <a:t>JediMentor' </a:t>
             </a:r>
             <a:r>
-              <a:rPr lang="en-US" sz="4400" smtClean="0">
-                <a:latin typeface="+mj-lt"/>
+              <a:rPr lang="en-US" sz="4000" smtClean="0">
+                <a:latin typeface="Courier New" panose="02070309020205020404" pitchFamily="49" charset="0"/>
+                <a:cs typeface="Courier New" panose="02070309020205020404" pitchFamily="49" charset="0"/>
               </a:rPr>
               <a:t>shape</a:t>
             </a:r>
@@ -13427,8 +13595,17 @@
             <a:pPr marL="0" indent="0" algn="ctr">
               <a:buNone/>
             </a:pPr>
+            <a:endParaRPr lang="de-DE" sz="2000" smtClean="0">
+              <a:latin typeface="Courier New" panose="02070309020205020404" pitchFamily="49" charset="0"/>
+              <a:cs typeface="Courier New" panose="02070309020205020404" pitchFamily="49" charset="0"/>
+            </a:endParaRPr>
+          </a:p>
+          <a:p>
+            <a:pPr marL="0" indent="0" algn="ctr">
+              <a:buNone/>
+            </a:pPr>
             <a:endParaRPr lang="en-US" sz="2000" smtClean="0">
-              <a:latin typeface="+mj-lt"/>
+              <a:latin typeface="Courier New" panose="02070309020205020404" pitchFamily="49" charset="0"/>
               <a:cs typeface="Courier New" panose="02070309020205020404" pitchFamily="49" charset="0"/>
             </a:endParaRPr>
           </a:p>
@@ -13574,14 +13751,23 @@
           <a:lstStyle/>
           <a:p>
             <a:r>
-              <a:rPr lang="de-DE"/>
+              <a:rPr lang="de-DE">
+                <a:latin typeface="Courier New" panose="02070309020205020404" pitchFamily="49" charset="0"/>
+                <a:cs typeface="Courier New" panose="02070309020205020404" pitchFamily="49" charset="0"/>
+              </a:rPr>
               <a:t>c</a:t>
             </a:r>
             <a:r>
-              <a:rPr lang="de-DE" smtClean="0"/>
+              <a:rPr lang="de-DE" smtClean="0">
+                <a:latin typeface="Courier New" panose="02070309020205020404" pitchFamily="49" charset="0"/>
+                <a:cs typeface="Courier New" panose="02070309020205020404" pitchFamily="49" charset="0"/>
+              </a:rPr>
               <a:t>onstraint (ShEx)</a:t>
             </a:r>
-            <a:endParaRPr lang="en-US"/>
+            <a:endParaRPr lang="en-US">
+              <a:latin typeface="Courier New" panose="02070309020205020404" pitchFamily="49" charset="0"/>
+              <a:cs typeface="Courier New" panose="02070309020205020404" pitchFamily="49" charset="0"/>
+            </a:endParaRPr>
           </a:p>
         </p:txBody>
       </p:sp>
@@ -13769,8 +13955,8 @@
         </p:nvSpPr>
         <p:spPr>
           <a:xfrm>
-            <a:off x="457200" y="476672"/>
-            <a:ext cx="8229600" cy="5649491"/>
+            <a:off x="179512" y="476672"/>
+            <a:ext cx="8784976" cy="5649491"/>
           </a:xfrm>
         </p:spPr>
         <p:txBody>
@@ -13783,20 +13969,23 @@
               <a:buNone/>
             </a:pPr>
             <a:r>
-              <a:rPr lang="en-US" sz="4400" smtClean="0">
-                <a:latin typeface="+mj-lt"/>
+              <a:rPr lang="en-US" sz="4000" smtClean="0">
+                <a:latin typeface="Courier New" panose="02070309020205020404" pitchFamily="49" charset="0"/>
+                <a:cs typeface="Courier New" panose="02070309020205020404" pitchFamily="49" charset="0"/>
               </a:rPr>
               <a:t>matching '</a:t>
             </a:r>
             <a:r>
-              <a:rPr lang="en-US" sz="4400">
-                <a:latin typeface="+mj-lt"/>
+              <a:rPr lang="en-US" sz="4000">
+                <a:latin typeface="Courier New" panose="02070309020205020404" pitchFamily="49" charset="0"/>
+                <a:cs typeface="Courier New" panose="02070309020205020404" pitchFamily="49" charset="0"/>
               </a:rPr>
               <a:t>JediStudent</a:t>
             </a:r>
             <a:r>
-              <a:rPr lang="en-US" sz="4400" smtClean="0">
-                <a:latin typeface="+mj-lt"/>
+              <a:rPr lang="en-US" sz="4000" smtClean="0">
+                <a:latin typeface="Courier New" panose="02070309020205020404" pitchFamily="49" charset="0"/>
+                <a:cs typeface="Courier New" panose="02070309020205020404" pitchFamily="49" charset="0"/>
               </a:rPr>
               <a:t>' shape</a:t>
             </a:r>
@@ -13806,7 +13995,7 @@
               <a:buNone/>
             </a:pPr>
             <a:endParaRPr lang="en-US" sz="2000" smtClean="0">
-              <a:latin typeface="+mj-lt"/>
+              <a:latin typeface="Courier New" panose="02070309020205020404" pitchFamily="49" charset="0"/>
               <a:cs typeface="Courier New" panose="02070309020205020404" pitchFamily="49" charset="0"/>
             </a:endParaRPr>
           </a:p>
@@ -14183,19 +14372,8 @@
                 <a:latin typeface="Courier New" panose="02070309020205020404" pitchFamily="49" charset="0"/>
                 <a:cs typeface="Courier New" panose="02070309020205020404" pitchFamily="49" charset="0"/>
               </a:rPr>
-              <a:t>executable </a:t>
-            </a:r>
-            <a:r>
-              <a:rPr lang="de-DE" smtClean="0">
-                <a:latin typeface="Courier New" panose="02070309020205020404" pitchFamily="49" charset="0"/>
-                <a:cs typeface="Courier New" panose="02070309020205020404" pitchFamily="49" charset="0"/>
-              </a:rPr>
-              <a:t>examples</a:t>
-            </a:r>
-            <a:endParaRPr lang="de-DE" smtClean="0">
-              <a:latin typeface="Courier New" panose="02070309020205020404" pitchFamily="49" charset="0"/>
-              <a:cs typeface="Courier New" panose="02070309020205020404" pitchFamily="49" charset="0"/>
-            </a:endParaRPr>
+              <a:t>executable examples</a:t>
+            </a:r>
           </a:p>
           <a:p>
             <a:pPr marL="0" indent="0" algn="ctr">
@@ -14265,14 +14443,7 @@
                 <a:latin typeface="Courier New" panose="02070309020205020404" pitchFamily="49" charset="0"/>
                 <a:cs typeface="Courier New" panose="02070309020205020404" pitchFamily="49" charset="0"/>
               </a:rPr>
-              <a:t>alidation </a:t>
-            </a:r>
-            <a:r>
-              <a:rPr lang="de-DE" smtClean="0">
-                <a:latin typeface="Courier New" panose="02070309020205020404" pitchFamily="49" charset="0"/>
-                <a:cs typeface="Courier New" panose="02070309020205020404" pitchFamily="49" charset="0"/>
-              </a:rPr>
-              <a:t>(ShEx)</a:t>
+              <a:t>alidation (ShEx)</a:t>
             </a:r>
             <a:endParaRPr lang="en-US">
               <a:latin typeface="Courier New" panose="02070309020205020404" pitchFamily="49" charset="0"/>
@@ -14342,11 +14513,16 @@
           <a:p>
             <a:r>
               <a:rPr lang="en-US" sz="4700">
+                <a:latin typeface="Courier New" panose="02070309020205020404" pitchFamily="49" charset="0"/>
+                <a:cs typeface="Courier New" panose="02070309020205020404" pitchFamily="49" charset="0"/>
                 <a:hlinkClick r:id="rId2"/>
               </a:rPr>
               <a:t>R-200-NEGATIVE-LITERAL-CONSTRAINTS</a:t>
             </a:r>
-            <a:endParaRPr lang="en-US" sz="4700"/>
+            <a:endParaRPr lang="en-US" sz="4700">
+              <a:latin typeface="Courier New" panose="02070309020205020404" pitchFamily="49" charset="0"/>
+              <a:cs typeface="Courier New" panose="02070309020205020404" pitchFamily="49" charset="0"/>
+            </a:endParaRPr>
           </a:p>
         </p:txBody>
       </p:sp>
@@ -14374,7 +14550,10 @@
               <a:buNone/>
             </a:pPr>
             <a:r>
-              <a:rPr lang="en-US"/>
+              <a:rPr lang="en-US">
+                <a:latin typeface="Courier New" panose="02070309020205020404" pitchFamily="49" charset="0"/>
+                <a:cs typeface="Courier New" panose="02070309020205020404" pitchFamily="49" charset="0"/>
+              </a:rPr>
               <a:t>ShEx, SPIN, SPARQL</a:t>
             </a:r>
           </a:p>
@@ -14433,14 +14612,23 @@
           <a:lstStyle/>
           <a:p>
             <a:r>
-              <a:rPr lang="de-DE"/>
+              <a:rPr lang="de-DE">
+                <a:latin typeface="Courier New" panose="02070309020205020404" pitchFamily="49" charset="0"/>
+                <a:cs typeface="Courier New" panose="02070309020205020404" pitchFamily="49" charset="0"/>
+              </a:rPr>
               <a:t>c</a:t>
             </a:r>
             <a:r>
-              <a:rPr lang="de-DE" smtClean="0"/>
+              <a:rPr lang="de-DE" smtClean="0">
+                <a:latin typeface="Courier New" panose="02070309020205020404" pitchFamily="49" charset="0"/>
+                <a:cs typeface="Courier New" panose="02070309020205020404" pitchFamily="49" charset="0"/>
+              </a:rPr>
               <a:t>onstraint (ShEx)</a:t>
             </a:r>
-            <a:endParaRPr lang="en-US"/>
+            <a:endParaRPr lang="en-US">
+              <a:latin typeface="Courier New" panose="02070309020205020404" pitchFamily="49" charset="0"/>
+              <a:cs typeface="Courier New" panose="02070309020205020404" pitchFamily="49" charset="0"/>
+            </a:endParaRPr>
           </a:p>
         </p:txBody>
       </p:sp>
@@ -14597,7 +14785,8 @@
             </a:pPr>
             <a:r>
               <a:rPr lang="en-US" sz="4400" smtClean="0">
-                <a:latin typeface="+mj-lt"/>
+                <a:latin typeface="Courier New" panose="02070309020205020404" pitchFamily="49" charset="0"/>
+                <a:cs typeface="Courier New" panose="02070309020205020404" pitchFamily="49" charset="0"/>
               </a:rPr>
               <a:t>matching 'Jedi' shape</a:t>
             </a:r>
@@ -14607,7 +14796,7 @@
               <a:buNone/>
             </a:pPr>
             <a:endParaRPr lang="en-US" sz="2000" smtClean="0">
-              <a:latin typeface="+mj-lt"/>
+              <a:latin typeface="Courier New" panose="02070309020205020404" pitchFamily="49" charset="0"/>
               <a:cs typeface="Courier New" panose="02070309020205020404" pitchFamily="49" charset="0"/>
             </a:endParaRPr>
           </a:p>
@@ -14778,14 +14967,23 @@
           <a:lstStyle/>
           <a:p>
             <a:r>
-              <a:rPr lang="de-DE"/>
+              <a:rPr lang="de-DE">
+                <a:latin typeface="Courier New" panose="02070309020205020404" pitchFamily="49" charset="0"/>
+                <a:cs typeface="Courier New" panose="02070309020205020404" pitchFamily="49" charset="0"/>
+              </a:rPr>
               <a:t>c</a:t>
             </a:r>
             <a:r>
-              <a:rPr lang="de-DE" smtClean="0"/>
+              <a:rPr lang="de-DE" smtClean="0">
+                <a:latin typeface="Courier New" panose="02070309020205020404" pitchFamily="49" charset="0"/>
+                <a:cs typeface="Courier New" panose="02070309020205020404" pitchFamily="49" charset="0"/>
+              </a:rPr>
               <a:t>onstraint (ShEx)</a:t>
             </a:r>
-            <a:endParaRPr lang="en-US"/>
+            <a:endParaRPr lang="en-US">
+              <a:latin typeface="Courier New" panose="02070309020205020404" pitchFamily="49" charset="0"/>
+              <a:cs typeface="Courier New" panose="02070309020205020404" pitchFamily="49" charset="0"/>
+            </a:endParaRPr>
           </a:p>
         </p:txBody>
       </p:sp>
@@ -15024,7 +15222,8 @@
             </a:pPr>
             <a:r>
               <a:rPr lang="en-US" sz="4400" smtClean="0">
-                <a:latin typeface="+mj-lt"/>
+                <a:latin typeface="Courier New" panose="02070309020205020404" pitchFamily="49" charset="0"/>
+                <a:cs typeface="Courier New" panose="02070309020205020404" pitchFamily="49" charset="0"/>
               </a:rPr>
               <a:t>matching 'Sith' shape</a:t>
             </a:r>
@@ -15034,7 +15233,7 @@
               <a:buNone/>
             </a:pPr>
             <a:endParaRPr lang="en-US" sz="2000" smtClean="0">
-              <a:latin typeface="+mj-lt"/>
+              <a:latin typeface="Courier New" panose="02070309020205020404" pitchFamily="49" charset="0"/>
               <a:cs typeface="Courier New" panose="02070309020205020404" pitchFamily="49" charset="0"/>
             </a:endParaRPr>
           </a:p>
@@ -15261,19 +15460,8 @@
                 <a:latin typeface="Courier New" panose="02070309020205020404" pitchFamily="49" charset="0"/>
                 <a:cs typeface="Courier New" panose="02070309020205020404" pitchFamily="49" charset="0"/>
               </a:rPr>
-              <a:t>executable </a:t>
-            </a:r>
-            <a:r>
-              <a:rPr lang="de-DE" smtClean="0">
-                <a:latin typeface="Courier New" panose="02070309020205020404" pitchFamily="49" charset="0"/>
-                <a:cs typeface="Courier New" panose="02070309020205020404" pitchFamily="49" charset="0"/>
-              </a:rPr>
-              <a:t>examples</a:t>
-            </a:r>
-            <a:endParaRPr lang="de-DE" smtClean="0">
-              <a:latin typeface="Courier New" panose="02070309020205020404" pitchFamily="49" charset="0"/>
-              <a:cs typeface="Courier New" panose="02070309020205020404" pitchFamily="49" charset="0"/>
-            </a:endParaRPr>
+              <a:t>executable examples</a:t>
+            </a:r>
           </a:p>
           <a:p>
             <a:pPr marL="0" indent="0" algn="ctr">
@@ -15335,14 +15523,7 @@
                 <a:latin typeface="Courier New" panose="02070309020205020404" pitchFamily="49" charset="0"/>
                 <a:cs typeface="Courier New" panose="02070309020205020404" pitchFamily="49" charset="0"/>
               </a:rPr>
-              <a:t>alidation </a:t>
-            </a:r>
-            <a:r>
-              <a:rPr lang="de-DE" smtClean="0">
-                <a:latin typeface="Courier New" panose="02070309020205020404" pitchFamily="49" charset="0"/>
-                <a:cs typeface="Courier New" panose="02070309020205020404" pitchFamily="49" charset="0"/>
-              </a:rPr>
-              <a:t>(ShEx)</a:t>
+              <a:t>alidation (ShEx)</a:t>
             </a:r>
             <a:endParaRPr lang="en-US">
               <a:latin typeface="Courier New" panose="02070309020205020404" pitchFamily="49" charset="0"/>
@@ -16744,15 +16925,21 @@
         <p:spPr/>
         <p:txBody>
           <a:bodyPr>
-            <a:normAutofit/>
+            <a:normAutofit fontScale="90000"/>
           </a:bodyPr>
           <a:lstStyle/>
           <a:p>
             <a:r>
-              <a:rPr lang="en-US" smtClean="0"/>
+              <a:rPr lang="en-US" smtClean="0">
+                <a:latin typeface="Courier New" panose="02070309020205020404" pitchFamily="49" charset="0"/>
+                <a:cs typeface="Courier New" panose="02070309020205020404" pitchFamily="49" charset="0"/>
+              </a:rPr>
               <a:t>validation and inferencing</a:t>
             </a:r>
-            <a:endParaRPr lang="en-US"/>
+            <a:endParaRPr lang="en-US">
+              <a:latin typeface="Courier New" panose="02070309020205020404" pitchFamily="49" charset="0"/>
+              <a:cs typeface="Courier New" panose="02070309020205020404" pitchFamily="49" charset="0"/>
+            </a:endParaRPr>
           </a:p>
         </p:txBody>
       </p:sp>
@@ -16769,72 +16956,103 @@
         <p:spPr/>
         <p:txBody>
           <a:bodyPr>
-            <a:normAutofit lnSpcReduction="10000"/>
+            <a:normAutofit fontScale="92500" lnSpcReduction="10000"/>
           </a:bodyPr>
           <a:lstStyle/>
           <a:p>
             <a:pPr marL="0" indent="0">
               <a:buNone/>
             </a:pPr>
-            <a:endParaRPr lang="en-US" smtClean="0"/>
+            <a:endParaRPr lang="en-US" smtClean="0">
+              <a:latin typeface="Courier New" panose="02070309020205020404" pitchFamily="49" charset="0"/>
+              <a:cs typeface="Courier New" panose="02070309020205020404" pitchFamily="49" charset="0"/>
+            </a:endParaRPr>
+          </a:p>
+          <a:p>
+            <a:pPr marL="0" indent="0" algn="ctr">
+              <a:buNone/>
+            </a:pPr>
+            <a:r>
+              <a:rPr lang="en-US" smtClean="0">
+                <a:latin typeface="Courier New" panose="02070309020205020404" pitchFamily="49" charset="0"/>
+                <a:cs typeface="Courier New" panose="02070309020205020404" pitchFamily="49" charset="0"/>
+                <a:hlinkClick r:id="rId2"/>
+              </a:rPr>
+              <a:t>R-113-INTERACTION-OF-VALIDATION-WITH-REASONING</a:t>
+            </a:r>
+            <a:endParaRPr lang="en-US">
+              <a:latin typeface="Courier New" panose="02070309020205020404" pitchFamily="49" charset="0"/>
+              <a:cs typeface="Courier New" panose="02070309020205020404" pitchFamily="49" charset="0"/>
+            </a:endParaRPr>
+          </a:p>
+          <a:p>
+            <a:pPr marL="0" indent="0" algn="ctr">
+              <a:buNone/>
+            </a:pPr>
+            <a:endParaRPr lang="de-DE" smtClean="0">
+              <a:latin typeface="Courier New" panose="02070309020205020404" pitchFamily="49" charset="0"/>
+              <a:cs typeface="Courier New" panose="02070309020205020404" pitchFamily="49" charset="0"/>
+            </a:endParaRPr>
+          </a:p>
+          <a:p>
+            <a:pPr marL="0" indent="0" algn="ctr">
+              <a:buNone/>
+            </a:pPr>
+            <a:r>
+              <a:rPr lang="en-US" smtClean="0">
+                <a:latin typeface="Courier New" panose="02070309020205020404" pitchFamily="49" charset="0"/>
+                <a:cs typeface="Courier New" panose="02070309020205020404" pitchFamily="49" charset="0"/>
+                <a:hlinkClick r:id="rId3"/>
+              </a:rPr>
+              <a:t>R-198-RDF-VALIDATION-AFTER-INFERENCING</a:t>
+            </a:r>
+            <a:endParaRPr lang="de-DE">
+              <a:latin typeface="Courier New" panose="02070309020205020404" pitchFamily="49" charset="0"/>
+              <a:cs typeface="Courier New" panose="02070309020205020404" pitchFamily="49" charset="0"/>
+            </a:endParaRPr>
           </a:p>
           <a:p>
             <a:pPr marL="0" indent="0">
               <a:buNone/>
             </a:pPr>
-            <a:r>
-              <a:rPr lang="en-US" smtClean="0">
-                <a:hlinkClick r:id="rId2"/>
-              </a:rPr>
-              <a:t>R-113-INTERACTION-OF-VALIDATION-WITH-REASONING</a:t>
-            </a:r>
-            <a:endParaRPr lang="en-US"/>
+            <a:endParaRPr lang="de-DE" smtClean="0">
+              <a:latin typeface="Courier New" panose="02070309020205020404" pitchFamily="49" charset="0"/>
+              <a:cs typeface="Courier New" panose="02070309020205020404" pitchFamily="49" charset="0"/>
+            </a:endParaRPr>
           </a:p>
           <a:p>
             <a:pPr marL="0" indent="0">
               <a:buNone/>
             </a:pPr>
-            <a:endParaRPr lang="de-DE" smtClean="0"/>
+            <a:endParaRPr lang="de-DE" smtClean="0">
+              <a:latin typeface="Courier New" panose="02070309020205020404" pitchFamily="49" charset="0"/>
+              <a:cs typeface="Courier New" panose="02070309020205020404" pitchFamily="49" charset="0"/>
+            </a:endParaRPr>
+          </a:p>
+          <a:p>
+            <a:pPr marL="0" indent="0" algn="ctr">
+              <a:buNone/>
+            </a:pPr>
+            <a:r>
+              <a:rPr lang="de-DE" smtClean="0">
+                <a:latin typeface="Courier New" panose="02070309020205020404" pitchFamily="49" charset="0"/>
+                <a:cs typeface="Courier New" panose="02070309020205020404" pitchFamily="49" charset="0"/>
+              </a:rPr>
+              <a:t>OWL 2</a:t>
+            </a:r>
+            <a:endParaRPr lang="en-US">
+              <a:latin typeface="Courier New" panose="02070309020205020404" pitchFamily="49" charset="0"/>
+              <a:cs typeface="Courier New" panose="02070309020205020404" pitchFamily="49" charset="0"/>
+            </a:endParaRPr>
           </a:p>
           <a:p>
             <a:pPr marL="0" indent="0">
               <a:buNone/>
             </a:pPr>
-            <a:r>
-              <a:rPr lang="en-US" smtClean="0">
-                <a:hlinkClick r:id="rId3"/>
-              </a:rPr>
-              <a:t>R-198-RDF-VALIDATION-AFTER-INFERENCING</a:t>
-            </a:r>
-            <a:endParaRPr lang="de-DE"/>
-          </a:p>
-          <a:p>
-            <a:pPr marL="0" indent="0">
-              <a:buNone/>
-            </a:pPr>
-            <a:endParaRPr lang="de-DE" smtClean="0"/>
-          </a:p>
-          <a:p>
-            <a:pPr marL="0" indent="0">
-              <a:buNone/>
-            </a:pPr>
-            <a:endParaRPr lang="de-DE" smtClean="0"/>
-          </a:p>
-          <a:p>
-            <a:pPr marL="0" indent="0" algn="ctr">
-              <a:buNone/>
-            </a:pPr>
-            <a:r>
-              <a:rPr lang="de-DE" smtClean="0"/>
-              <a:t>OWL 2</a:t>
-            </a:r>
-            <a:endParaRPr lang="en-US"/>
-          </a:p>
-          <a:p>
-            <a:pPr marL="0" indent="0">
-              <a:buNone/>
-            </a:pPr>
-            <a:endParaRPr lang="en-US"/>
+            <a:endParaRPr lang="en-US">
+              <a:latin typeface="Courier New" panose="02070309020205020404" pitchFamily="49" charset="0"/>
+              <a:cs typeface="Courier New" panose="02070309020205020404" pitchFamily="49" charset="0"/>
+            </a:endParaRPr>
           </a:p>
         </p:txBody>
       </p:sp>
@@ -17183,15 +17401,23 @@
           <a:p>
             <a:r>
               <a:rPr lang="en-US" smtClean="0">
+                <a:latin typeface="Courier New" panose="02070309020205020404" pitchFamily="49" charset="0"/>
+                <a:cs typeface="Courier New" panose="02070309020205020404" pitchFamily="49" charset="0"/>
                 <a:hlinkClick r:id="rId3"/>
               </a:rPr>
               <a:t>R-63-TRANSITIVE-OBJECT-PROPERTIES</a:t>
             </a:r>
             <a:r>
-              <a:rPr lang="de-DE" smtClean="0"/>
+              <a:rPr lang="de-DE" smtClean="0">
+                <a:latin typeface="Courier New" panose="02070309020205020404" pitchFamily="49" charset="0"/>
+                <a:cs typeface="Courier New" panose="02070309020205020404" pitchFamily="49" charset="0"/>
+              </a:rPr>
               <a:t> (constraint)</a:t>
             </a:r>
-            <a:endParaRPr lang="en-US"/>
+            <a:endParaRPr lang="en-US">
+              <a:latin typeface="Courier New" panose="02070309020205020404" pitchFamily="49" charset="0"/>
+              <a:cs typeface="Courier New" panose="02070309020205020404" pitchFamily="49" charset="0"/>
+            </a:endParaRPr>
           </a:p>
         </p:txBody>
       </p:sp>
@@ -17253,7 +17479,7 @@
               <a:t>ancestorOf a </a:t>
             </a:r>
             <a:r>
-              <a:rPr lang="en-US" sz="2800" b="1">
+              <a:rPr lang="en-US" sz="2800">
                 <a:solidFill>
                   <a:srgbClr val="FF0000"/>
                 </a:solidFill>
@@ -17328,15 +17554,23 @@
           <a:p>
             <a:r>
               <a:rPr lang="en-US" smtClean="0">
+                <a:latin typeface="Courier New" panose="02070309020205020404" pitchFamily="49" charset="0"/>
+                <a:cs typeface="Courier New" panose="02070309020205020404" pitchFamily="49" charset="0"/>
                 <a:hlinkClick r:id="rId3"/>
               </a:rPr>
               <a:t>R-63-TRANSITIVE-OBJECT-PROPERTIES</a:t>
             </a:r>
             <a:r>
-              <a:rPr lang="de-DE" smtClean="0"/>
+              <a:rPr lang="de-DE" smtClean="0">
+                <a:latin typeface="Courier New" panose="02070309020205020404" pitchFamily="49" charset="0"/>
+                <a:cs typeface="Courier New" panose="02070309020205020404" pitchFamily="49" charset="0"/>
+              </a:rPr>
               <a:t> (data)</a:t>
             </a:r>
-            <a:endParaRPr lang="en-US"/>
+            <a:endParaRPr lang="en-US">
+              <a:latin typeface="Courier New" panose="02070309020205020404" pitchFamily="49" charset="0"/>
+              <a:cs typeface="Courier New" panose="02070309020205020404" pitchFamily="49" charset="0"/>
+            </a:endParaRPr>
           </a:p>
         </p:txBody>
       </p:sp>
@@ -17480,7 +17714,7 @@
               <a:buNone/>
             </a:pPr>
             <a:r>
-              <a:rPr lang="en-US" sz="2400" b="1" smtClean="0">
+              <a:rPr lang="en-US" sz="2400" smtClean="0">
                 <a:solidFill>
                   <a:srgbClr val="FF0000"/>
                 </a:solidFill>
@@ -17490,7 +17724,7 @@
               <a:t># :</a:t>
             </a:r>
             <a:r>
-              <a:rPr lang="en-US" sz="2400" b="1">
+              <a:rPr lang="en-US" sz="2400">
                 <a:solidFill>
                   <a:srgbClr val="FF0000"/>
                 </a:solidFill>
@@ -17499,7 +17733,7 @@
               </a:rPr>
               <a:t>Carter </a:t>
             </a:r>
-            <a:endParaRPr lang="en-US" sz="2400" b="1" smtClean="0">
+            <a:endParaRPr lang="en-US" sz="2400" smtClean="0">
               <a:solidFill>
                 <a:srgbClr val="FF0000"/>
               </a:solidFill>
@@ -17512,7 +17746,7 @@
               <a:buNone/>
             </a:pPr>
             <a:r>
-              <a:rPr lang="en-US" sz="2400" b="1" smtClean="0">
+              <a:rPr lang="en-US" sz="2400" smtClean="0">
                 <a:solidFill>
                   <a:srgbClr val="FF0000"/>
                 </a:solidFill>
@@ -17522,7 +17756,7 @@
               <a:t>#     :</a:t>
             </a:r>
             <a:r>
-              <a:rPr lang="en-US" sz="2400" b="1">
+              <a:rPr lang="en-US" sz="2400">
                 <a:solidFill>
                   <a:srgbClr val="FF0000"/>
                 </a:solidFill>
@@ -17532,7 +17766,7 @@
               <a:t>ancestorOf :Meg </a:t>
             </a:r>
             <a:r>
-              <a:rPr lang="en-US" sz="2400" b="1" smtClean="0">
+              <a:rPr lang="en-US" sz="2400" smtClean="0">
                 <a:solidFill>
                   <a:srgbClr val="FF0000"/>
                 </a:solidFill>
@@ -17546,7 +17780,7 @@
             <a:pPr marL="0" indent="0">
               <a:buNone/>
             </a:pPr>
-            <a:endParaRPr lang="de-DE" sz="2400" b="1">
+            <a:endParaRPr lang="de-DE" sz="2400">
               <a:solidFill>
                 <a:srgbClr val="FF0000"/>
               </a:solidFill>
@@ -17558,7 +17792,7 @@
             <a:pPr marL="0" indent="0">
               <a:buNone/>
             </a:pPr>
-            <a:endParaRPr lang="de-DE" sz="2400" b="1" smtClean="0">
+            <a:endParaRPr lang="de-DE" sz="2400" smtClean="0">
               <a:solidFill>
                 <a:srgbClr val="FF0000"/>
               </a:solidFill>
@@ -17571,7 +17805,7 @@
               <a:buNone/>
             </a:pPr>
             <a:r>
-              <a:rPr lang="de-DE" sz="2400" b="1" smtClean="0">
+              <a:rPr lang="de-DE" sz="2400" smtClean="0">
                 <a:solidFill>
                   <a:srgbClr val="FF0000"/>
                 </a:solidFill>
@@ -17582,7 +17816,7 @@
               </a:rPr>
               <a:t>validation without inferencing</a:t>
             </a:r>
-            <a:endParaRPr lang="de-DE" sz="2400" b="1" smtClean="0">
+            <a:endParaRPr lang="de-DE" sz="2400" smtClean="0">
               <a:solidFill>
                 <a:srgbClr val="FF0000"/>
               </a:solidFill>
@@ -17597,7 +17831,7 @@
               <a:buChar char="à"/>
             </a:pPr>
             <a:r>
-              <a:rPr lang="de-DE" sz="2400" b="1">
+              <a:rPr lang="de-DE" sz="2400">
                 <a:solidFill>
                   <a:srgbClr val="FF0000"/>
                 </a:solidFill>
@@ -17608,7 +17842,7 @@
               <a:t>c</a:t>
             </a:r>
             <a:r>
-              <a:rPr lang="de-DE" sz="2400" b="1" smtClean="0">
+              <a:rPr lang="de-DE" sz="2400" smtClean="0">
                 <a:solidFill>
                   <a:srgbClr val="FF0000"/>
                 </a:solidFill>
@@ -17618,7 +17852,7 @@
               </a:rPr>
               <a:t>onstraint violation</a:t>
             </a:r>
-            <a:endParaRPr lang="en-US" sz="2400" b="1">
+            <a:endParaRPr lang="en-US" sz="2400">
               <a:solidFill>
                 <a:srgbClr val="FF0000"/>
               </a:solidFill>
@@ -17684,15 +17918,23 @@
           <a:p>
             <a:r>
               <a:rPr lang="en-US" smtClean="0">
+                <a:latin typeface="Courier New" panose="02070309020205020404" pitchFamily="49" charset="0"/>
+                <a:cs typeface="Courier New" panose="02070309020205020404" pitchFamily="49" charset="0"/>
                 <a:hlinkClick r:id="rId3"/>
               </a:rPr>
               <a:t>R-63-TRANSITIVE-OBJECT-PROPERTIES</a:t>
             </a:r>
             <a:r>
-              <a:rPr lang="de-DE" smtClean="0"/>
+              <a:rPr lang="de-DE" smtClean="0">
+                <a:latin typeface="Courier New" panose="02070309020205020404" pitchFamily="49" charset="0"/>
+                <a:cs typeface="Courier New" panose="02070309020205020404" pitchFamily="49" charset="0"/>
+              </a:rPr>
               <a:t> (data)</a:t>
             </a:r>
-            <a:endParaRPr lang="en-US"/>
+            <a:endParaRPr lang="en-US">
+              <a:latin typeface="Courier New" panose="02070309020205020404" pitchFamily="49" charset="0"/>
+              <a:cs typeface="Courier New" panose="02070309020205020404" pitchFamily="49" charset="0"/>
+            </a:endParaRPr>
           </a:p>
         </p:txBody>
       </p:sp>
@@ -17764,7 +18006,7 @@
               <a:buNone/>
             </a:pPr>
             <a:r>
-              <a:rPr lang="de-DE" sz="2400" b="1" smtClean="0">
+              <a:rPr lang="de-DE" sz="2400" smtClean="0">
                 <a:solidFill>
                   <a:srgbClr val="FF0000"/>
                 </a:solidFill>
@@ -17774,7 +18016,7 @@
               <a:t>    a </a:t>
             </a:r>
             <a:r>
-              <a:rPr lang="de-DE" sz="2400" b="1">
+              <a:rPr lang="de-DE" sz="2400">
                 <a:solidFill>
                   <a:srgbClr val="FF0000"/>
                 </a:solidFill>
@@ -17784,7 +18026,7 @@
               <a:t>owl2spin:ToInfer </a:t>
             </a:r>
             <a:r>
-              <a:rPr lang="de-DE" sz="2400" b="1" smtClean="0">
+              <a:rPr lang="de-DE" sz="2400" smtClean="0">
                 <a:solidFill>
                   <a:srgbClr val="FF0000"/>
                 </a:solidFill>
@@ -17868,7 +18110,7 @@
               <a:buNone/>
             </a:pPr>
             <a:r>
-              <a:rPr lang="en-US" sz="2400" b="1" smtClean="0">
+              <a:rPr lang="en-US" sz="2400" smtClean="0">
                 <a:solidFill>
                   <a:srgbClr val="FF0000"/>
                 </a:solidFill>
@@ -17878,7 +18120,7 @@
               <a:t>:</a:t>
             </a:r>
             <a:r>
-              <a:rPr lang="en-US" sz="2400" b="1">
+              <a:rPr lang="en-US" sz="2400">
                 <a:solidFill>
                   <a:srgbClr val="FF0000"/>
                 </a:solidFill>
@@ -17887,7 +18129,7 @@
               </a:rPr>
               <a:t>Carter </a:t>
             </a:r>
-            <a:endParaRPr lang="en-US" sz="2400" b="1" smtClean="0">
+            <a:endParaRPr lang="en-US" sz="2400" smtClean="0">
               <a:solidFill>
                 <a:srgbClr val="FF0000"/>
               </a:solidFill>
@@ -17900,7 +18142,7 @@
               <a:buNone/>
             </a:pPr>
             <a:r>
-              <a:rPr lang="en-US" sz="2400" b="1" smtClean="0">
+              <a:rPr lang="en-US" sz="2400" smtClean="0">
                 <a:solidFill>
                   <a:srgbClr val="FF0000"/>
                 </a:solidFill>
@@ -17910,7 +18152,7 @@
               <a:t>    :</a:t>
             </a:r>
             <a:r>
-              <a:rPr lang="en-US" sz="2400" b="1">
+              <a:rPr lang="en-US" sz="2400">
                 <a:solidFill>
                   <a:srgbClr val="FF0000"/>
                 </a:solidFill>
@@ -17919,7 +18161,7 @@
               </a:rPr>
               <a:t>ancestorOf :Meg .</a:t>
             </a:r>
-            <a:endParaRPr lang="en-US" sz="2400" b="1" smtClean="0">
+            <a:endParaRPr lang="en-US" sz="2400" smtClean="0">
               <a:solidFill>
                 <a:srgbClr val="FF0000"/>
               </a:solidFill>
@@ -17932,7 +18174,7 @@
               <a:buNone/>
             </a:pPr>
             <a:r>
-              <a:rPr lang="de-DE" sz="2400" b="1">
+              <a:rPr lang="de-DE" sz="2400">
                 <a:solidFill>
                   <a:srgbClr val="FF0000"/>
                 </a:solidFill>
@@ -17946,7 +18188,7 @@
             <a:pPr marL="0" indent="0">
               <a:buNone/>
             </a:pPr>
-            <a:endParaRPr lang="de-DE" sz="2400" b="1" smtClean="0">
+            <a:endParaRPr lang="de-DE" sz="2400" smtClean="0">
               <a:solidFill>
                 <a:srgbClr val="FF0000"/>
               </a:solidFill>
@@ -17959,7 +18201,7 @@
               <a:buNone/>
             </a:pPr>
             <a:r>
-              <a:rPr lang="de-DE" sz="2400" b="1" smtClean="0">
+              <a:rPr lang="de-DE" sz="2400" smtClean="0">
                 <a:solidFill>
                   <a:srgbClr val="FF0000"/>
                 </a:solidFill>
@@ -17970,7 +18212,7 @@
               </a:rPr>
               <a:t>validation with inferencing</a:t>
             </a:r>
-            <a:endParaRPr lang="de-DE" sz="2400" b="1" smtClean="0">
+            <a:endParaRPr lang="de-DE" sz="2400" smtClean="0">
               <a:solidFill>
                 <a:srgbClr val="FF0000"/>
               </a:solidFill>
@@ -17985,7 +18227,7 @@
               <a:buChar char="à"/>
             </a:pPr>
             <a:r>
-              <a:rPr lang="de-DE" sz="2400" b="1" smtClean="0">
+              <a:rPr lang="de-DE" sz="2400" smtClean="0">
                 <a:solidFill>
                   <a:srgbClr val="FF0000"/>
                 </a:solidFill>
@@ -17995,7 +18237,7 @@
               </a:rPr>
               <a:t>NO constraint violation</a:t>
             </a:r>
-            <a:endParaRPr lang="en-US" sz="2400" b="1">
+            <a:endParaRPr lang="en-US" sz="2400">
               <a:solidFill>
                 <a:srgbClr val="FF0000"/>
               </a:solidFill>
@@ -18231,21 +18473,7 @@
                 <a:latin typeface="Courier New" panose="02070309020205020404" pitchFamily="49" charset="0"/>
                 <a:cs typeface="Courier New" panose="02070309020205020404" pitchFamily="49" charset="0"/>
               </a:rPr>
-              <a:t>onstraint (</a:t>
-            </a:r>
-            <a:r>
-              <a:rPr lang="de-DE" smtClean="0">
-                <a:latin typeface="Courier New" panose="02070309020205020404" pitchFamily="49" charset="0"/>
-                <a:cs typeface="Courier New" panose="02070309020205020404" pitchFamily="49" charset="0"/>
-              </a:rPr>
-              <a:t>OWL2</a:t>
-            </a:r>
-            <a:r>
-              <a:rPr lang="de-DE" smtClean="0">
-                <a:latin typeface="Courier New" panose="02070309020205020404" pitchFamily="49" charset="0"/>
-                <a:cs typeface="Courier New" panose="02070309020205020404" pitchFamily="49" charset="0"/>
-              </a:rPr>
-              <a:t>)</a:t>
+              <a:t>onstraint (OWL2)</a:t>
             </a:r>
             <a:endParaRPr lang="en-US">
               <a:latin typeface="Courier New" panose="02070309020205020404" pitchFamily="49" charset="0"/>
@@ -18450,7 +18678,7 @@
               <a:rPr lang="en-US">
                 <a:latin typeface="Courier New" panose="02070309020205020404" pitchFamily="49" charset="0"/>
                 <a:cs typeface="Courier New" panose="02070309020205020404" pitchFamily="49" charset="0"/>
-                <a:hlinkClick r:id="rId3" action="ppaction://hlinkfile"/>
+                <a:hlinkClick r:id="rId3"/>
               </a:rPr>
               <a:t>purl.org/net/rdfval-demo</a:t>
             </a:r>
@@ -18477,19 +18705,8 @@
                 <a:latin typeface="Courier New" panose="02070309020205020404" pitchFamily="49" charset="0"/>
                 <a:cs typeface="Courier New" panose="02070309020205020404" pitchFamily="49" charset="0"/>
               </a:rPr>
-              <a:t>executable </a:t>
-            </a:r>
-            <a:r>
-              <a:rPr lang="de-DE" smtClean="0">
-                <a:latin typeface="Courier New" panose="02070309020205020404" pitchFamily="49" charset="0"/>
-                <a:cs typeface="Courier New" panose="02070309020205020404" pitchFamily="49" charset="0"/>
-              </a:rPr>
-              <a:t>examples</a:t>
-            </a:r>
-            <a:endParaRPr lang="de-DE" smtClean="0">
-              <a:latin typeface="Courier New" panose="02070309020205020404" pitchFamily="49" charset="0"/>
-              <a:cs typeface="Courier New" panose="02070309020205020404" pitchFamily="49" charset="0"/>
-            </a:endParaRPr>
+              <a:t>executable examples</a:t>
+            </a:r>
           </a:p>
           <a:p>
             <a:pPr marL="0" indent="0" algn="ctr">
@@ -18559,21 +18776,7 @@
                 <a:latin typeface="Courier New" panose="02070309020205020404" pitchFamily="49" charset="0"/>
                 <a:cs typeface="Courier New" panose="02070309020205020404" pitchFamily="49" charset="0"/>
               </a:rPr>
-              <a:t>alidation (DSP, </a:t>
-            </a:r>
-            <a:r>
-              <a:rPr lang="de-DE" smtClean="0">
-                <a:latin typeface="Courier New" panose="02070309020205020404" pitchFamily="49" charset="0"/>
-                <a:cs typeface="Courier New" panose="02070309020205020404" pitchFamily="49" charset="0"/>
-              </a:rPr>
-              <a:t>OWL2</a:t>
-            </a:r>
-            <a:r>
-              <a:rPr lang="de-DE" smtClean="0">
-                <a:latin typeface="Courier New" panose="02070309020205020404" pitchFamily="49" charset="0"/>
-                <a:cs typeface="Courier New" panose="02070309020205020404" pitchFamily="49" charset="0"/>
-              </a:rPr>
-              <a:t>)</a:t>
+              <a:t>alidation (DSP, OWL2)</a:t>
             </a:r>
             <a:endParaRPr lang="en-US">
               <a:latin typeface="Courier New" panose="02070309020205020404" pitchFamily="49" charset="0"/>
@@ -18621,7 +18824,7 @@
       </p:grpSpPr>
       <p:sp>
         <p:nvSpPr>
-          <p:cNvPr id="4" name="Titel 3"/>
+          <p:cNvPr id="2" name="Titel 1"/>
           <p:cNvSpPr>
             <a:spLocks noGrp="1"/>
           </p:cNvSpPr>
@@ -18631,19 +18834,81 @@
         </p:nvSpPr>
         <p:spPr>
           <a:xfrm>
-            <a:off x="0" y="1556792"/>
-            <a:ext cx="9144000" cy="1143000"/>
+            <a:off x="457200" y="1637928"/>
+            <a:ext cx="8229600" cy="1143000"/>
           </a:xfrm>
         </p:spPr>
         <p:txBody>
           <a:bodyPr>
-            <a:normAutofit/>
+            <a:noAutofit/>
           </a:bodyPr>
           <a:lstStyle/>
           <a:p>
             <a:r>
-              <a:rPr lang="en-US" sz="5200"/>
+              <a:rPr lang="en-US" sz="4800" smtClean="0">
+                <a:latin typeface="Courier New" panose="02070309020205020404" pitchFamily="49" charset="0"/>
+                <a:cs typeface="Courier New" panose="02070309020205020404" pitchFamily="49" charset="0"/>
+                <a:hlinkClick r:id="rId2"/>
+              </a:rPr>
               <a:t>R-68-REQUIRED-PROPERTIES</a:t>
+            </a:r>
+            <a:endParaRPr lang="en-US" sz="4700">
+              <a:latin typeface="Courier New" panose="02070309020205020404" pitchFamily="49" charset="0"/>
+              <a:cs typeface="Courier New" panose="02070309020205020404" pitchFamily="49" charset="0"/>
+            </a:endParaRPr>
+          </a:p>
+        </p:txBody>
+      </p:sp>
+      <p:sp>
+        <p:nvSpPr>
+          <p:cNvPr id="3" name="Inhaltsplatzhalter 2"/>
+          <p:cNvSpPr>
+            <a:spLocks noGrp="1"/>
+          </p:cNvSpPr>
+          <p:nvPr>
+            <p:ph idx="1"/>
+          </p:nvPr>
+        </p:nvSpPr>
+        <p:spPr>
+          <a:xfrm>
+            <a:off x="457200" y="4476253"/>
+            <a:ext cx="8229600" cy="2193107"/>
+          </a:xfrm>
+        </p:spPr>
+        <p:txBody>
+          <a:bodyPr/>
+          <a:lstStyle/>
+          <a:p>
+            <a:pPr marL="0" indent="0" algn="ctr">
+              <a:buNone/>
+            </a:pPr>
+            <a:r>
+              <a:rPr lang="en-US" smtClean="0">
+                <a:latin typeface="Courier New" panose="02070309020205020404" pitchFamily="49" charset="0"/>
+                <a:cs typeface="Courier New" panose="02070309020205020404" pitchFamily="49" charset="0"/>
+              </a:rPr>
+              <a:t>Bibframe, DQTP, DSP</a:t>
+            </a:r>
+            <a:r>
+              <a:rPr lang="en-US" smtClean="0">
+                <a:latin typeface="Courier New" panose="02070309020205020404" pitchFamily="49" charset="0"/>
+                <a:cs typeface="Courier New" panose="02070309020205020404" pitchFamily="49" charset="0"/>
+              </a:rPr>
+              <a:t>, OWL 2, </a:t>
+            </a:r>
+            <a:r>
+              <a:rPr lang="en-US" smtClean="0">
+                <a:latin typeface="Courier New" panose="02070309020205020404" pitchFamily="49" charset="0"/>
+                <a:cs typeface="Courier New" panose="02070309020205020404" pitchFamily="49" charset="0"/>
+              </a:rPr>
+              <a:t>ReSh, ShEx, SPIN</a:t>
+            </a:r>
+            <a:r>
+              <a:rPr lang="en-US">
+                <a:latin typeface="Courier New" panose="02070309020205020404" pitchFamily="49" charset="0"/>
+                <a:cs typeface="Courier New" panose="02070309020205020404" pitchFamily="49" charset="0"/>
+              </a:rPr>
+              <a:t>, SPARQL</a:t>
             </a:r>
           </a:p>
         </p:txBody>
@@ -18651,7 +18916,7 @@
     </p:spTree>
     <p:extLst>
       <p:ext uri="{BB962C8B-B14F-4D97-AF65-F5344CB8AC3E}">
-        <p14:creationId xmlns:p14="http://schemas.microsoft.com/office/powerpoint/2010/main" val="4194098293"/>
+        <p14:creationId xmlns:p14="http://schemas.microsoft.com/office/powerpoint/2010/main" val="2871565621"/>
       </p:ext>
     </p:extLst>
   </p:cSld>
@@ -18712,13 +18977,15 @@
             </a:pPr>
             <a:r>
               <a:rPr lang="de-DE" sz="4400">
-                <a:latin typeface="+mj-lt"/>
+                <a:latin typeface="Courier New" panose="02070309020205020404" pitchFamily="49" charset="0"/>
+                <a:cs typeface="Courier New" panose="02070309020205020404" pitchFamily="49" charset="0"/>
               </a:rPr>
               <a:t>valid </a:t>
             </a:r>
             <a:r>
               <a:rPr lang="de-DE" sz="4400" smtClean="0">
-                <a:latin typeface="+mj-lt"/>
+                <a:latin typeface="Courier New" panose="02070309020205020404" pitchFamily="49" charset="0"/>
+                <a:cs typeface="Courier New" panose="02070309020205020404" pitchFamily="49" charset="0"/>
               </a:rPr>
               <a:t>data</a:t>
             </a:r>
@@ -18728,7 +18995,7 @@
               <a:buNone/>
             </a:pPr>
             <a:endParaRPr lang="en-US" sz="2000" smtClean="0">
-              <a:latin typeface="+mj-lt"/>
+              <a:latin typeface="Courier New" panose="02070309020205020404" pitchFamily="49" charset="0"/>
               <a:cs typeface="Courier New" panose="02070309020205020404" pitchFamily="49" charset="0"/>
             </a:endParaRPr>
           </a:p>
@@ -19683,6 +19950,15 @@
 </file>
 
 <file path=customXml/item1.xml><?xml version="1.0" encoding="utf-8"?>
+<?mso-contentType ?>
+<FormTemplates xmlns="http://schemas.microsoft.com/sharepoint/v3/contenttype/forms">
+  <Display>DocumentLibraryForm</Display>
+  <Edit>DocumentLibraryForm</Edit>
+  <New>DocumentLibraryForm</New>
+</FormTemplates>
+</file>
+
+<file path=customXml/item2.xml><?xml version="1.0" encoding="utf-8"?>
 <ct:contentTypeSchema xmlns:ct="http://schemas.microsoft.com/office/2006/metadata/contentType" xmlns:ma="http://schemas.microsoft.com/office/2006/metadata/properties/metaAttributes" ct:_="" ma:_="" ma:contentTypeName="Dokument" ma:contentTypeID="0x010100B1ACB0F0E4D8D847898BCFF327EAA86F" ma:contentTypeVersion="14" ma:contentTypeDescription="Ein neues Dokument erstellen." ma:contentTypeScope="" ma:versionID="076608a465e9f4abe123e33d8ae2290f">
   <xsd:schema xmlns:xsd="http://www.w3.org/2001/XMLSchema" xmlns:xs="http://www.w3.org/2001/XMLSchema" xmlns:p="http://schemas.microsoft.com/office/2006/metadata/properties" xmlns:ns2="f90a23b0-552c-4f8d-b330-f53f4fcdfcf9" targetNamespace="http://schemas.microsoft.com/office/2006/metadata/properties" ma:root="true" ma:fieldsID="9f72fafb60184820a38988fa3fe2d22b" ns2:_="">
     <xsd:import namespace="f90a23b0-552c-4f8d-b330-f53f4fcdfcf9"/>
@@ -19827,28 +20103,7 @@
 </ct:contentTypeSchema>
 </file>
 
-<file path=customXml/item2.xml><?xml version="1.0" encoding="utf-8"?>
-<?mso-contentType ?>
-<FormTemplates xmlns="http://schemas.microsoft.com/sharepoint/v3/contenttype/forms">
-  <Display>DocumentLibraryForm</Display>
-  <Edit>DocumentLibraryForm</Edit>
-  <New>DocumentLibraryForm</New>
-</FormTemplates>
-</file>
-
 <file path=customXml/item3.xml><?xml version="1.0" encoding="utf-8"?>
-<p:properties xmlns:p="http://schemas.microsoft.com/office/2006/metadata/properties" xmlns:xsi="http://www.w3.org/2001/XMLSchema-instance">
-  <documentManagement>
-    <_dlc_DocIdUrl xmlns="f90a23b0-552c-4f8d-b330-f53f4fcdfcf9">
-      <Url>http://intranet.gesis.intra/pr/Vorlagen/_layouts/DocIdRedir.aspx?ID=GESISDOC-552-18</Url>
-      <Description>GESISDOC-552-18</Description>
-    </_dlc_DocIdUrl>
-    <_dlc_DocId xmlns="f90a23b0-552c-4f8d-b330-f53f4fcdfcf9">GESISDOC-552-18</_dlc_DocId>
-  </documentManagement>
-</p:properties>
-</file>
-
-<file path=customXml/item4.xml><?xml version="1.0" encoding="utf-8"?>
 <?mso-contentType ?>
 <spe:Receivers xmlns:spe="http://schemas.microsoft.com/sharepoint/events">
   <Receiver>
@@ -19894,7 +20149,27 @@
 </spe:Receivers>
 </file>
 
+<file path=customXml/item4.xml><?xml version="1.0" encoding="utf-8"?>
+<p:properties xmlns:p="http://schemas.microsoft.com/office/2006/metadata/properties" xmlns:xsi="http://www.w3.org/2001/XMLSchema-instance">
+  <documentManagement>
+    <_dlc_DocIdUrl xmlns="f90a23b0-552c-4f8d-b330-f53f4fcdfcf9">
+      <Url>http://intranet.gesis.intra/pr/Vorlagen/_layouts/DocIdRedir.aspx?ID=GESISDOC-552-18</Url>
+      <Description>GESISDOC-552-18</Description>
+    </_dlc_DocIdUrl>
+    <_dlc_DocId xmlns="f90a23b0-552c-4f8d-b330-f53f4fcdfcf9">GESISDOC-552-18</_dlc_DocId>
+  </documentManagement>
+</p:properties>
+</file>
+
 <file path=customXml/itemProps1.xml><?xml version="1.0" encoding="utf-8"?>
+<ds:datastoreItem xmlns:ds="http://schemas.openxmlformats.org/officeDocument/2006/customXml" ds:itemID="{D12E0BAE-FAF0-4E78-A2C3-2AAC064B5FDE}">
+  <ds:schemaRefs>
+    <ds:schemaRef ds:uri="http://schemas.microsoft.com/sharepoint/v3/contenttype/forms"/>
+  </ds:schemaRefs>
+</ds:datastoreItem>
+</file>
+
+<file path=customXml/itemProps2.xml><?xml version="1.0" encoding="utf-8"?>
 <ds:datastoreItem xmlns:ds="http://schemas.openxmlformats.org/officeDocument/2006/customXml" ds:itemID="{2EA11C62-2FF4-41AB-AE80-7BB53752809E}">
   <ds:schemaRefs>
     <ds:schemaRef ds:uri="http://schemas.microsoft.com/office/2006/metadata/contentType"/>
@@ -19912,15 +20187,15 @@
 </ds:datastoreItem>
 </file>
 
-<file path=customXml/itemProps2.xml><?xml version="1.0" encoding="utf-8"?>
-<ds:datastoreItem xmlns:ds="http://schemas.openxmlformats.org/officeDocument/2006/customXml" ds:itemID="{D12E0BAE-FAF0-4E78-A2C3-2AAC064B5FDE}">
+<file path=customXml/itemProps3.xml><?xml version="1.0" encoding="utf-8"?>
+<ds:datastoreItem xmlns:ds="http://schemas.openxmlformats.org/officeDocument/2006/customXml" ds:itemID="{182FFA55-C622-4F3D-AABF-4236B175EAD1}">
   <ds:schemaRefs>
-    <ds:schemaRef ds:uri="http://schemas.microsoft.com/sharepoint/v3/contenttype/forms"/>
+    <ds:schemaRef ds:uri="http://schemas.microsoft.com/sharepoint/events"/>
   </ds:schemaRefs>
 </ds:datastoreItem>
 </file>
 
-<file path=customXml/itemProps3.xml><?xml version="1.0" encoding="utf-8"?>
+<file path=customXml/itemProps4.xml><?xml version="1.0" encoding="utf-8"?>
 <ds:datastoreItem xmlns:ds="http://schemas.openxmlformats.org/officeDocument/2006/customXml" ds:itemID="{4449D386-2FCB-4353-94CE-7C0896CF81B1}">
   <ds:schemaRefs>
     <ds:schemaRef ds:uri="http://purl.org/dc/terms/"/>
@@ -19934,12 +20209,4 @@
     <ds:schemaRef ds:uri="http://purl.org/dc/dcmitype/"/>
   </ds:schemaRefs>
 </ds:datastoreItem>
-</file>
-
-<file path=customXml/itemProps4.xml><?xml version="1.0" encoding="utf-8"?>
-<ds:datastoreItem xmlns:ds="http://schemas.openxmlformats.org/officeDocument/2006/customXml" ds:itemID="{182FFA55-C622-4F3D-AABF-4236B175EAD1}">
-  <ds:schemaRefs>
-    <ds:schemaRef ds:uri="http://schemas.microsoft.com/sharepoint/events"/>
-  </ds:schemaRefs>
-</ds:datastoreItem>
 </file>
</xml_diff>